<commit_message>
Add Engagement Scope slides with solution-specific scope for Azure solutions
- Document Intelligence: IDP scope (document types, AI/ML complexity, accuracy)
- Enterprise Landing Zone: Landing zone scope (management groups, subscriptions, policies)
- Sentinel SIEM: Security scope (data connectors, analytics rules, log ingestion)
- DevOps Enterprise Platform: DevOps scope (repositories, pipelines, deployments)
- Virtual Desktop: AVD scope (host pools, app groups, user profiles)
- Virtual WAN Global: Network scope (WAN hubs, VPN connections, bandwidth)
- Updated LOE CSVs with proper SCOPE ASSUMPTIONS structure for Doc Intel and Landing Zone
- Regenerated all 6 PPTX files with 11-slide structure including Engagement Scope
</commit_message>
<xml_diff>
--- a/solutions/azure/ai/document-intelligence/presales/solution-briefing.pptx
+++ b/solutions/azure/ai/document-intelligence/presales/solution-briefing.pptx
@@ -18,6 +18,7 @@
     <p:sldId id="263" r:id="rId14"/>
     <p:sldId id="264" r:id="rId15"/>
     <p:sldId id="265" r:id="rId16"/>
+    <p:sldId id="266" r:id="rId17"/>
   </p:sldIdLst>
   <p:sldSz cx="9144000" cy="5143500" type="screen16x9"/>
   <p:notesSz cx="5143500" cy="9144000"/>
@@ -3339,7 +3340,7 @@
           <a:lstStyle/>
           <a:p>
             <a:r>
-              <a:t>Azure AI Document Intelligence</a:t>
+              <a:t>Azure Document Intelligence</a:t>
             </a:r>
           </a:p>
         </p:txBody>
@@ -3360,7 +3361,7 @@
           <a:lstStyle/>
           <a:p>
             <a:r>
-              <a:t>[Presenter Name] | November 15, 2025</a:t>
+              <a:t>[Presenter Name] | November 16, 2025</a:t>
             </a:r>
           </a:p>
         </p:txBody>
@@ -3398,6 +3399,174 @@
 </file>
 
 <file path=ppt/slides/slide10.xml><?xml version="1.0" encoding="utf-8"?>
+<p:sld xmlns:a="http://schemas.openxmlformats.org/drawingml/2006/main" xmlns:p="http://schemas.openxmlformats.org/presentationml/2006/main" xmlns:r="http://schemas.openxmlformats.org/officeDocument/2006/relationships">
+  <p:cSld>
+    <p:spTree>
+      <p:nvGrpSpPr>
+        <p:cNvPr id="1" name=""/>
+        <p:cNvGrpSpPr/>
+        <p:nvPr/>
+      </p:nvGrpSpPr>
+      <p:grpSpPr/>
+      <p:sp>
+        <p:nvSpPr>
+          <p:cNvPr id="2" name="Text Placeholder 1"/>
+          <p:cNvSpPr>
+            <a:spLocks noGrp="1"/>
+          </p:cNvSpPr>
+          <p:nvPr>
+            <p:ph type="body" idx="10" sz="quarter"/>
+          </p:nvPr>
+        </p:nvSpPr>
+        <p:spPr/>
+        <p:txBody>
+          <a:bodyPr/>
+          <a:lstStyle/>
+          <a:p>
+            <a:r>
+              <a:t>Next Steps</a:t>
+            </a:r>
+          </a:p>
+        </p:txBody>
+      </p:sp>
+      <p:pic>
+        <p:nvPicPr>
+          <p:cNvPr id="3" name="Picture Placeholder 2" descr="consulting_company_logo.png"/>
+          <p:cNvPicPr>
+            <a:picLocks noGrp="1" noChangeAspect="1"/>
+          </p:cNvPicPr>
+          <p:nvPr>
+            <p:ph type="pic" idx="13" sz="quarter"/>
+          </p:nvPr>
+        </p:nvPicPr>
+        <p:blipFill>
+          <a:blip r:embed="rId2"/>
+          <a:srcRect t="6762" b="6762"/>
+          <a:stretch>
+            <a:fillRect/>
+          </a:stretch>
+        </p:blipFill>
+        <p:spPr/>
+      </p:pic>
+      <p:sp>
+        <p:nvSpPr>
+          <p:cNvPr id="4" name="Text Placeholder 3"/>
+          <p:cNvSpPr>
+            <a:spLocks noGrp="1"/>
+          </p:cNvSpPr>
+          <p:nvPr>
+            <p:ph type="body" idx="14" sz="quarter"/>
+          </p:nvPr>
+        </p:nvSpPr>
+        <p:spPr/>
+        <p:txBody>
+          <a:bodyPr/>
+          <a:lstStyle/>
+          <a:p>
+            <a:pPr/>
+            <a:r>
+              <a:rPr b="1"/>
+              <a:t>Document Samples:</a:t>
+            </a:r>
+            <a:r>
+              <a:t> Provide 50+ samples per document type for model training</a:t>
+            </a:r>
+          </a:p>
+          <a:p>
+            <a:pPr/>
+            <a:r>
+              <a:rPr b="1"/>
+              <a:t>Decision:</a:t>
+            </a:r>
+            <a:r>
+              <a:t> SOW approval and contract execution by [Target Date]</a:t>
+            </a:r>
+          </a:p>
+          <a:p>
+            <a:pPr/>
+            <a:r>
+              <a:rPr b="1"/>
+              <a:t>Kickoff:</a:t>
+            </a:r>
+            <a:r>
+              <a:t> Project initiation scheduled for [Start Date]</a:t>
+            </a:r>
+          </a:p>
+          <a:p>
+            <a:pPr/>
+            <a:r>
+              <a:rPr b="1"/>
+              <a:t>Week 1:</a:t>
+            </a:r>
+            <a:r>
+              <a:t> Azure environment setup and security configuration</a:t>
+            </a:r>
+          </a:p>
+          <a:p>
+            <a:pPr/>
+            <a:r>
+              <a:rPr b="1"/>
+              <a:t>Week 2:</a:t>
+            </a:r>
+            <a:r>
+              <a:t> Document analysis and model selection workshop</a:t>
+            </a:r>
+          </a:p>
+          <a:p>
+            <a:pPr/>
+            <a:r>
+              <a:rPr b="1"/>
+              <a:t>Week 3:</a:t>
+            </a:r>
+            <a:r>
+              <a:t> Initial model training with sample documents</a:t>
+            </a:r>
+          </a:p>
+          <a:p>
+            <a:pPr/>
+            <a:r>
+              <a:rPr b="1"/>
+              <a:t>Week 4:</a:t>
+            </a:r>
+            <a:r>
+              <a:t> First automated extractions validated</a:t>
+            </a:r>
+          </a:p>
+        </p:txBody>
+      </p:sp>
+      <p:pic>
+        <p:nvPicPr>
+          <p:cNvPr id="5" name="Picture 4" descr="eo-framework-logo-real.png"/>
+          <p:cNvPicPr>
+            <a:picLocks noChangeAspect="1"/>
+          </p:cNvPicPr>
+          <p:nvPr/>
+        </p:nvPicPr>
+        <p:blipFill>
+          <a:blip r:embed="rId3"/>
+          <a:stretch>
+            <a:fillRect/>
+          </a:stretch>
+        </p:blipFill>
+        <p:spPr>
+          <a:xfrm>
+            <a:off x="6684264" y="4535424"/>
+            <a:ext cx="2139696" cy="530352"/>
+          </a:xfrm>
+          <a:prstGeom prst="rect">
+            <a:avLst/>
+          </a:prstGeom>
+        </p:spPr>
+      </p:pic>
+    </p:spTree>
+  </p:cSld>
+  <p:clrMapOvr>
+    <a:masterClrMapping/>
+  </p:clrMapOvr>
+</p:sld>
+</file>
+
+<file path=ppt/slides/slide11.xml><?xml version="1.0" encoding="utf-8"?>
 <p:sld xmlns:a="http://schemas.openxmlformats.org/drawingml/2006/main" xmlns:p="http://schemas.openxmlformats.org/presentationml/2006/main" xmlns:r="http://schemas.openxmlformats.org/officeDocument/2006/relationships">
   <p:cSld>
     <p:spTree>
@@ -3615,19 +3784,19 @@
           <a:p>
             <a:pPr lvl="1"/>
             <a:r>
-              <a:t>Eliminate manual data entry bottlenecks and reduce processing time from hours to minutes</a:t>
+              <a:t>Eliminate manual data entry and reduce document processing time by 80% with AI-powered extraction</a:t>
             </a:r>
           </a:p>
           <a:p>
             <a:pPr lvl="1"/>
             <a:r>
-              <a:t>Achieve 99%+ accuracy with AI-powered extraction replacing error-prone manual processes</a:t>
+              <a:t>Achieve 95%+ accuracy using pre-built and custom models trained on your document types</a:t>
             </a:r>
           </a:p>
           <a:p>
             <a:pPr lvl="1"/>
             <a:r>
-              <a:t>Scale effortlessly to handle volume fluctuations without adding headcount</a:t>
+              <a:t>Scale document processing automatically to handle peak volumes without additional staffing</a:t>
             </a:r>
           </a:p>
         </p:txBody>
@@ -3656,19 +3825,19 @@
           <a:p>
             <a:pPr lvl="1"/>
             <a:r>
-              <a:t>90% reduction in document processing time with measurable productivity gains</a:t>
+              <a:t>85% reduction in manual data entry with measurable FTE savings within 6 months</a:t>
             </a:r>
           </a:p>
           <a:p>
             <a:pPr lvl="1"/>
             <a:r>
-              <a:t>95%+ data extraction accuracy validated against business requirements</a:t>
+              <a:t>95%+ extraction accuracy validated against business-critical document types</a:t>
             </a:r>
           </a:p>
           <a:p>
             <a:pPr lvl="1"/>
             <a:r>
-              <a:t>ROI realization within 12-18 months through labor cost savings and efficiency gains</a:t>
+              <a:t>Full integration with existing LOB systems (ERP, CRM, SharePoint) operational by Month 4</a:t>
             </a:r>
           </a:p>
         </p:txBody>
@@ -3730,6 +3899,1032 @@
           <a:bodyPr/>
           <a:lstStyle/>
           <a:p>
+            <a:pPr algn="l"/>
+            <a:r>
+              <a:rPr b="1"/>
+              <a:t>Engagement Scope</a:t>
+            </a:r>
+          </a:p>
+        </p:txBody>
+      </p:sp>
+      <p:pic>
+        <p:nvPicPr>
+          <p:cNvPr id="3" name="Picture Placeholder 2" descr="consulting_company_logo.png"/>
+          <p:cNvPicPr>
+            <a:picLocks noGrp="1" noChangeAspect="1"/>
+          </p:cNvPicPr>
+          <p:nvPr>
+            <p:ph type="pic" idx="13" sz="quarter"/>
+          </p:nvPr>
+        </p:nvPicPr>
+        <p:blipFill>
+          <a:blip r:embed="rId2"/>
+          <a:srcRect t="6404" b="6404"/>
+          <a:stretch>
+            <a:fillRect/>
+          </a:stretch>
+        </p:blipFill>
+        <p:spPr/>
+      </p:pic>
+      <p:graphicFrame>
+        <p:nvGraphicFramePr>
+          <p:cNvPr id="4" name="Table Placeholder 3"/>
+          <p:cNvGraphicFramePr>
+            <a:graphicFrameLocks noGrp="1"/>
+          </p:cNvGraphicFramePr>
+          <p:nvPr>
+            <p:ph type="tbl" idx="14" sz="quarter"/>
+          </p:nvPr>
+        </p:nvGraphicFramePr>
+        <p:xfrm>
+          <a:off x="256855" y="677011"/>
+          <a:ext cx="8710931" cy="6304280"/>
+        </p:xfrm>
+        <a:graphic>
+          <a:graphicData uri="http://schemas.openxmlformats.org/drawingml/2006/table">
+            <a:tbl>
+              <a:tblPr firstRow="1" bandRow="1">
+                <a:tableStyleId>{5C22544A-7EE6-4342-B048-85BDC9FD1C3A}</a:tableStyleId>
+              </a:tblPr>
+              <a:tblGrid>
+                <a:gridCol w="2613279"/>
+                <a:gridCol w="3048826"/>
+                <a:gridCol w="3048826"/>
+              </a:tblGrid>
+              <a:tr h="370840">
+                <a:tc>
+                  <a:txBody>
+                    <a:bodyPr/>
+                    <a:lstStyle/>
+                    <a:p>
+                      <a:r>
+                        <a:rPr sz="1400">
+                          <a:solidFill>
+                            <a:srgbClr val="FFFFFF"/>
+                          </a:solidFill>
+                        </a:rPr>
+                        <a:t>Category</a:t>
+                      </a:r>
+                    </a:p>
+                  </a:txBody>
+                  <a:tcPr>
+                    <a:solidFill>
+                      <a:srgbClr val="A01C02"/>
+                    </a:solidFill>
+                  </a:tcPr>
+                </a:tc>
+                <a:tc>
+                  <a:txBody>
+                    <a:bodyPr/>
+                    <a:lstStyle/>
+                    <a:p>
+                      <a:r>
+                        <a:rPr sz="1400">
+                          <a:solidFill>
+                            <a:srgbClr val="FFFFFF"/>
+                          </a:solidFill>
+                        </a:rPr>
+                        <a:t>Parameter</a:t>
+                      </a:r>
+                    </a:p>
+                  </a:txBody>
+                  <a:tcPr>
+                    <a:solidFill>
+                      <a:srgbClr val="A01C02"/>
+                    </a:solidFill>
+                  </a:tcPr>
+                </a:tc>
+                <a:tc>
+                  <a:txBody>
+                    <a:bodyPr/>
+                    <a:lstStyle/>
+                    <a:p>
+                      <a:r>
+                        <a:rPr sz="1400">
+                          <a:solidFill>
+                            <a:srgbClr val="FFFFFF"/>
+                          </a:solidFill>
+                        </a:rPr>
+                        <a:t>Scope</a:t>
+                      </a:r>
+                    </a:p>
+                  </a:txBody>
+                  <a:tcPr>
+                    <a:solidFill>
+                      <a:srgbClr val="A01C02"/>
+                    </a:solidFill>
+                  </a:tcPr>
+                </a:tc>
+              </a:tr>
+              <a:tr h="370840">
+                <a:tc>
+                  <a:txBody>
+                    <a:bodyPr/>
+                    <a:lstStyle/>
+                    <a:p>
+                      <a:r>
+                        <a:rPr sz="1100"/>
+                        <a:t>Solution Scope</a:t>
+                      </a:r>
+                    </a:p>
+                  </a:txBody>
+                  <a:tcPr>
+                    <a:solidFill>
+                      <a:srgbClr val="E7E6E6"/>
+                    </a:solidFill>
+                  </a:tcPr>
+                </a:tc>
+                <a:tc>
+                  <a:txBody>
+                    <a:bodyPr/>
+                    <a:lstStyle/>
+                    <a:p>
+                      <a:r>
+                        <a:rPr sz="1100"/>
+                        <a:t>Document Types</a:t>
+                      </a:r>
+                    </a:p>
+                  </a:txBody>
+                  <a:tcPr>
+                    <a:solidFill>
+                      <a:srgbClr val="E7E6E6"/>
+                    </a:solidFill>
+                  </a:tcPr>
+                </a:tc>
+                <a:tc>
+                  <a:txBody>
+                    <a:bodyPr/>
+                    <a:lstStyle/>
+                    <a:p>
+                      <a:r>
+                        <a:rPr sz="1100"/>
+                        <a:t>3 document types (invoices receipts forms)</a:t>
+                      </a:r>
+                    </a:p>
+                  </a:txBody>
+                  <a:tcPr>
+                    <a:solidFill>
+                      <a:srgbClr val="E7E6E6"/>
+                    </a:solidFill>
+                  </a:tcPr>
+                </a:tc>
+              </a:tr>
+              <a:tr h="370840">
+                <a:tc>
+                  <a:txBody>
+                    <a:bodyPr/>
+                    <a:lstStyle/>
+                    <a:p>
+                      <a:r>
+                        <a:rPr sz="1100"/>
+                        <a:t>Solution Scope</a:t>
+                      </a:r>
+                    </a:p>
+                  </a:txBody>
+                  <a:tcPr>
+                    <a:solidFill>
+                      <a:srgbClr val="E7E6E6"/>
+                    </a:solidFill>
+                  </a:tcPr>
+                </a:tc>
+                <a:tc>
+                  <a:txBody>
+                    <a:bodyPr/>
+                    <a:lstStyle/>
+                    <a:p>
+                      <a:r>
+                        <a:rPr sz="1100"/>
+                        <a:t>AI/ML Complexity</a:t>
+                      </a:r>
+                    </a:p>
+                  </a:txBody>
+                  <a:tcPr>
+                    <a:solidFill>
+                      <a:srgbClr val="E7E6E6"/>
+                    </a:solidFill>
+                  </a:tcPr>
+                </a:tc>
+                <a:tc>
+                  <a:txBody>
+                    <a:bodyPr/>
+                    <a:lstStyle/>
+                    <a:p>
+                      <a:r>
+                        <a:rPr sz="1100"/>
+                        <a:t>Azure Document Intelligence pre-built</a:t>
+                      </a:r>
+                    </a:p>
+                  </a:txBody>
+                  <a:tcPr>
+                    <a:solidFill>
+                      <a:srgbClr val="E7E6E6"/>
+                    </a:solidFill>
+                  </a:tcPr>
+                </a:tc>
+              </a:tr>
+              <a:tr h="370840">
+                <a:tc>
+                  <a:txBody>
+                    <a:bodyPr/>
+                    <a:lstStyle/>
+                    <a:p>
+                      <a:r>
+                        <a:rPr sz="1100"/>
+                        <a:t>Integration</a:t>
+                      </a:r>
+                    </a:p>
+                  </a:txBody>
+                  <a:tcPr>
+                    <a:solidFill>
+                      <a:srgbClr val="E7E6E6"/>
+                    </a:solidFill>
+                  </a:tcPr>
+                </a:tc>
+                <a:tc>
+                  <a:txBody>
+                    <a:bodyPr/>
+                    <a:lstStyle/>
+                    <a:p>
+                      <a:r>
+                        <a:rPr sz="1100"/>
+                        <a:t>External System Integrations</a:t>
+                      </a:r>
+                    </a:p>
+                  </a:txBody>
+                  <a:tcPr>
+                    <a:solidFill>
+                      <a:srgbClr val="E7E6E6"/>
+                    </a:solidFill>
+                  </a:tcPr>
+                </a:tc>
+                <a:tc>
+                  <a:txBody>
+                    <a:bodyPr/>
+                    <a:lstStyle/>
+                    <a:p>
+                      <a:r>
+                        <a:rPr sz="1100"/>
+                        <a:t>2 REST APIs (CRM ERP)</a:t>
+                      </a:r>
+                    </a:p>
+                  </a:txBody>
+                  <a:tcPr>
+                    <a:solidFill>
+                      <a:srgbClr val="E7E6E6"/>
+                    </a:solidFill>
+                  </a:tcPr>
+                </a:tc>
+              </a:tr>
+              <a:tr h="370840">
+                <a:tc>
+                  <a:txBody>
+                    <a:bodyPr/>
+                    <a:lstStyle/>
+                    <a:p>
+                      <a:r>
+                        <a:rPr sz="1100"/>
+                        <a:t>Integration</a:t>
+                      </a:r>
+                    </a:p>
+                  </a:txBody>
+                  <a:tcPr>
+                    <a:solidFill>
+                      <a:srgbClr val="E7E6E6"/>
+                    </a:solidFill>
+                  </a:tcPr>
+                </a:tc>
+                <a:tc>
+                  <a:txBody>
+                    <a:bodyPr/>
+                    <a:lstStyle/>
+                    <a:p>
+                      <a:r>
+                        <a:rPr sz="1100"/>
+                        <a:t>Data Sources</a:t>
+                      </a:r>
+                    </a:p>
+                  </a:txBody>
+                  <a:tcPr>
+                    <a:solidFill>
+                      <a:srgbClr val="E7E6E6"/>
+                    </a:solidFill>
+                  </a:tcPr>
+                </a:tc>
+                <a:tc>
+                  <a:txBody>
+                    <a:bodyPr/>
+                    <a:lstStyle/>
+                    <a:p>
+                      <a:r>
+                        <a:rPr sz="1100"/>
+                        <a:t>Blob Storage and SharePoint</a:t>
+                      </a:r>
+                    </a:p>
+                  </a:txBody>
+                  <a:tcPr>
+                    <a:solidFill>
+                      <a:srgbClr val="E7E6E6"/>
+                    </a:solidFill>
+                  </a:tcPr>
+                </a:tc>
+              </a:tr>
+              <a:tr h="370840">
+                <a:tc>
+                  <a:txBody>
+                    <a:bodyPr/>
+                    <a:lstStyle/>
+                    <a:p>
+                      <a:r>
+                        <a:rPr sz="1100"/>
+                        <a:t>User Base</a:t>
+                      </a:r>
+                    </a:p>
+                  </a:txBody>
+                  <a:tcPr>
+                    <a:solidFill>
+                      <a:srgbClr val="E7E6E6"/>
+                    </a:solidFill>
+                  </a:tcPr>
+                </a:tc>
+                <a:tc>
+                  <a:txBody>
+                    <a:bodyPr/>
+                    <a:lstStyle/>
+                    <a:p>
+                      <a:r>
+                        <a:rPr sz="1100"/>
+                        <a:t>Total Users</a:t>
+                      </a:r>
+                    </a:p>
+                  </a:txBody>
+                  <a:tcPr>
+                    <a:solidFill>
+                      <a:srgbClr val="E7E6E6"/>
+                    </a:solidFill>
+                  </a:tcPr>
+                </a:tc>
+                <a:tc>
+                  <a:txBody>
+                    <a:bodyPr/>
+                    <a:lstStyle/>
+                    <a:p>
+                      <a:r>
+                        <a:rPr sz="1100"/>
+                        <a:t>75 users</a:t>
+                      </a:r>
+                    </a:p>
+                  </a:txBody>
+                  <a:tcPr>
+                    <a:solidFill>
+                      <a:srgbClr val="E7E6E6"/>
+                    </a:solidFill>
+                  </a:tcPr>
+                </a:tc>
+              </a:tr>
+              <a:tr h="370840">
+                <a:tc>
+                  <a:txBody>
+                    <a:bodyPr/>
+                    <a:lstStyle/>
+                    <a:p>
+                      <a:r>
+                        <a:rPr sz="1100"/>
+                        <a:t>User Base</a:t>
+                      </a:r>
+                    </a:p>
+                  </a:txBody>
+                  <a:tcPr>
+                    <a:solidFill>
+                      <a:srgbClr val="E7E6E6"/>
+                    </a:solidFill>
+                  </a:tcPr>
+                </a:tc>
+                <a:tc>
+                  <a:txBody>
+                    <a:bodyPr/>
+                    <a:lstStyle/>
+                    <a:p>
+                      <a:r>
+                        <a:rPr sz="1100"/>
+                        <a:t>User Roles</a:t>
+                      </a:r>
+                    </a:p>
+                  </a:txBody>
+                  <a:tcPr>
+                    <a:solidFill>
+                      <a:srgbClr val="E7E6E6"/>
+                    </a:solidFill>
+                  </a:tcPr>
+                </a:tc>
+                <a:tc>
+                  <a:txBody>
+                    <a:bodyPr/>
+                    <a:lstStyle/>
+                    <a:p>
+                      <a:r>
+                        <a:rPr sz="1100"/>
+                        <a:t>3 roles (submitter reviewer admin)</a:t>
+                      </a:r>
+                    </a:p>
+                  </a:txBody>
+                  <a:tcPr>
+                    <a:solidFill>
+                      <a:srgbClr val="E7E6E6"/>
+                    </a:solidFill>
+                  </a:tcPr>
+                </a:tc>
+              </a:tr>
+              <a:tr h="370840">
+                <a:tc>
+                  <a:txBody>
+                    <a:bodyPr/>
+                    <a:lstStyle/>
+                    <a:p>
+                      <a:r>
+                        <a:rPr sz="1100"/>
+                        <a:t>Data Volume</a:t>
+                      </a:r>
+                    </a:p>
+                  </a:txBody>
+                  <a:tcPr>
+                    <a:solidFill>
+                      <a:srgbClr val="E7E6E6"/>
+                    </a:solidFill>
+                  </a:tcPr>
+                </a:tc>
+                <a:tc>
+                  <a:txBody>
+                    <a:bodyPr/>
+                    <a:lstStyle/>
+                    <a:p>
+                      <a:r>
+                        <a:rPr sz="1100"/>
+                        <a:t>Document Processing Volume</a:t>
+                      </a:r>
+                    </a:p>
+                  </a:txBody>
+                  <a:tcPr>
+                    <a:solidFill>
+                      <a:srgbClr val="E7E6E6"/>
+                    </a:solidFill>
+                  </a:tcPr>
+                </a:tc>
+                <a:tc>
+                  <a:txBody>
+                    <a:bodyPr/>
+                    <a:lstStyle/>
+                    <a:p>
+                      <a:r>
+                        <a:rPr sz="1100"/>
+                        <a:t>2000 docs/month</a:t>
+                      </a:r>
+                    </a:p>
+                  </a:txBody>
+                  <a:tcPr>
+                    <a:solidFill>
+                      <a:srgbClr val="E7E6E6"/>
+                    </a:solidFill>
+                  </a:tcPr>
+                </a:tc>
+              </a:tr>
+              <a:tr h="370840">
+                <a:tc>
+                  <a:txBody>
+                    <a:bodyPr/>
+                    <a:lstStyle/>
+                    <a:p>
+                      <a:r>
+                        <a:rPr sz="1100"/>
+                        <a:t>Data Volume</a:t>
+                      </a:r>
+                    </a:p>
+                  </a:txBody>
+                  <a:tcPr>
+                    <a:solidFill>
+                      <a:srgbClr val="E7E6E6"/>
+                    </a:solidFill>
+                  </a:tcPr>
+                </a:tc>
+                <a:tc>
+                  <a:txBody>
+                    <a:bodyPr/>
+                    <a:lstStyle/>
+                    <a:p>
+                      <a:r>
+                        <a:rPr sz="1100"/>
+                        <a:t>Data Storage Requirements</a:t>
+                      </a:r>
+                    </a:p>
+                  </a:txBody>
+                  <a:tcPr>
+                    <a:solidFill>
+                      <a:srgbClr val="E7E6E6"/>
+                    </a:solidFill>
+                  </a:tcPr>
+                </a:tc>
+                <a:tc>
+                  <a:txBody>
+                    <a:bodyPr/>
+                    <a:lstStyle/>
+                    <a:p>
+                      <a:r>
+                        <a:rPr sz="1100"/>
+                        <a:t>250 GB</a:t>
+                      </a:r>
+                    </a:p>
+                  </a:txBody>
+                  <a:tcPr>
+                    <a:solidFill>
+                      <a:srgbClr val="E7E6E6"/>
+                    </a:solidFill>
+                  </a:tcPr>
+                </a:tc>
+              </a:tr>
+              <a:tr h="370840">
+                <a:tc>
+                  <a:txBody>
+                    <a:bodyPr/>
+                    <a:lstStyle/>
+                    <a:p>
+                      <a:r>
+                        <a:rPr sz="1100"/>
+                        <a:t>Technical Environment</a:t>
+                      </a:r>
+                    </a:p>
+                  </a:txBody>
+                  <a:tcPr>
+                    <a:solidFill>
+                      <a:srgbClr val="E7E6E6"/>
+                    </a:solidFill>
+                  </a:tcPr>
+                </a:tc>
+                <a:tc>
+                  <a:txBody>
+                    <a:bodyPr/>
+                    <a:lstStyle/>
+                    <a:p>
+                      <a:r>
+                        <a:rPr sz="1100"/>
+                        <a:t>Deployment Regions</a:t>
+                      </a:r>
+                    </a:p>
+                  </a:txBody>
+                  <a:tcPr>
+                    <a:solidFill>
+                      <a:srgbClr val="E7E6E6"/>
+                    </a:solidFill>
+                  </a:tcPr>
+                </a:tc>
+                <a:tc>
+                  <a:txBody>
+                    <a:bodyPr/>
+                    <a:lstStyle/>
+                    <a:p>
+                      <a:r>
+                        <a:rPr sz="1100"/>
+                        <a:t>Single Azure region (East US)</a:t>
+                      </a:r>
+                    </a:p>
+                  </a:txBody>
+                  <a:tcPr>
+                    <a:solidFill>
+                      <a:srgbClr val="E7E6E6"/>
+                    </a:solidFill>
+                  </a:tcPr>
+                </a:tc>
+              </a:tr>
+              <a:tr h="370840">
+                <a:tc>
+                  <a:txBody>
+                    <a:bodyPr/>
+                    <a:lstStyle/>
+                    <a:p>
+                      <a:r>
+                        <a:rPr sz="1100"/>
+                        <a:t>Technical Environment</a:t>
+                      </a:r>
+                    </a:p>
+                  </a:txBody>
+                  <a:tcPr>
+                    <a:solidFill>
+                      <a:srgbClr val="E7E6E6"/>
+                    </a:solidFill>
+                  </a:tcPr>
+                </a:tc>
+                <a:tc>
+                  <a:txBody>
+                    <a:bodyPr/>
+                    <a:lstStyle/>
+                    <a:p>
+                      <a:r>
+                        <a:rPr sz="1100"/>
+                        <a:t>Availability Requirements</a:t>
+                      </a:r>
+                    </a:p>
+                  </a:txBody>
+                  <a:tcPr>
+                    <a:solidFill>
+                      <a:srgbClr val="E7E6E6"/>
+                    </a:solidFill>
+                  </a:tcPr>
+                </a:tc>
+                <a:tc>
+                  <a:txBody>
+                    <a:bodyPr/>
+                    <a:lstStyle/>
+                    <a:p>
+                      <a:r>
+                        <a:rPr sz="1100"/>
+                        <a:t>Standard (99.5%)</a:t>
+                      </a:r>
+                    </a:p>
+                  </a:txBody>
+                  <a:tcPr>
+                    <a:solidFill>
+                      <a:srgbClr val="E7E6E6"/>
+                    </a:solidFill>
+                  </a:tcPr>
+                </a:tc>
+              </a:tr>
+              <a:tr h="370840">
+                <a:tc>
+                  <a:txBody>
+                    <a:bodyPr/>
+                    <a:lstStyle/>
+                    <a:p>
+                      <a:r>
+                        <a:rPr sz="1100"/>
+                        <a:t>Technical Environment</a:t>
+                      </a:r>
+                    </a:p>
+                  </a:txBody>
+                  <a:tcPr>
+                    <a:solidFill>
+                      <a:srgbClr val="E7E6E6"/>
+                    </a:solidFill>
+                  </a:tcPr>
+                </a:tc>
+                <a:tc>
+                  <a:txBody>
+                    <a:bodyPr/>
+                    <a:lstStyle/>
+                    <a:p>
+                      <a:r>
+                        <a:rPr sz="1100"/>
+                        <a:t>Infrastructure Complexity</a:t>
+                      </a:r>
+                    </a:p>
+                  </a:txBody>
+                  <a:tcPr>
+                    <a:solidFill>
+                      <a:srgbClr val="E7E6E6"/>
+                    </a:solidFill>
+                  </a:tcPr>
+                </a:tc>
+                <a:tc>
+                  <a:txBody>
+                    <a:bodyPr/>
+                    <a:lstStyle/>
+                    <a:p>
+                      <a:r>
+                        <a:rPr sz="1100"/>
+                        <a:t>Serverless (Functions Blob Doc Intel)</a:t>
+                      </a:r>
+                    </a:p>
+                  </a:txBody>
+                  <a:tcPr>
+                    <a:solidFill>
+                      <a:srgbClr val="E7E6E6"/>
+                    </a:solidFill>
+                  </a:tcPr>
+                </a:tc>
+              </a:tr>
+              <a:tr h="370840">
+                <a:tc>
+                  <a:txBody>
+                    <a:bodyPr/>
+                    <a:lstStyle/>
+                    <a:p>
+                      <a:r>
+                        <a:rPr sz="1100"/>
+                        <a:t>Security &amp; Compliance</a:t>
+                      </a:r>
+                    </a:p>
+                  </a:txBody>
+                  <a:tcPr>
+                    <a:solidFill>
+                      <a:srgbClr val="E7E6E6"/>
+                    </a:solidFill>
+                  </a:tcPr>
+                </a:tc>
+                <a:tc>
+                  <a:txBody>
+                    <a:bodyPr/>
+                    <a:lstStyle/>
+                    <a:p>
+                      <a:r>
+                        <a:rPr sz="1100"/>
+                        <a:t>Security Requirements</a:t>
+                      </a:r>
+                    </a:p>
+                  </a:txBody>
+                  <a:tcPr>
+                    <a:solidFill>
+                      <a:srgbClr val="E7E6E6"/>
+                    </a:solidFill>
+                  </a:tcPr>
+                </a:tc>
+                <a:tc>
+                  <a:txBody>
+                    <a:bodyPr/>
+                    <a:lstStyle/>
+                    <a:p>
+                      <a:r>
+                        <a:rPr sz="1100"/>
+                        <a:t>RBAC encryption at rest/transit</a:t>
+                      </a:r>
+                    </a:p>
+                  </a:txBody>
+                  <a:tcPr>
+                    <a:solidFill>
+                      <a:srgbClr val="E7E6E6"/>
+                    </a:solidFill>
+                  </a:tcPr>
+                </a:tc>
+              </a:tr>
+              <a:tr h="370840">
+                <a:tc>
+                  <a:txBody>
+                    <a:bodyPr/>
+                    <a:lstStyle/>
+                    <a:p>
+                      <a:r>
+                        <a:rPr sz="1100"/>
+                        <a:t>Security &amp; Compliance</a:t>
+                      </a:r>
+                    </a:p>
+                  </a:txBody>
+                  <a:tcPr>
+                    <a:solidFill>
+                      <a:srgbClr val="E7E6E6"/>
+                    </a:solidFill>
+                  </a:tcPr>
+                </a:tc>
+                <a:tc>
+                  <a:txBody>
+                    <a:bodyPr/>
+                    <a:lstStyle/>
+                    <a:p>
+                      <a:r>
+                        <a:rPr sz="1100"/>
+                        <a:t>Compliance Frameworks</a:t>
+                      </a:r>
+                    </a:p>
+                  </a:txBody>
+                  <a:tcPr>
+                    <a:solidFill>
+                      <a:srgbClr val="E7E6E6"/>
+                    </a:solidFill>
+                  </a:tcPr>
+                </a:tc>
+                <a:tc>
+                  <a:txBody>
+                    <a:bodyPr/>
+                    <a:lstStyle/>
+                    <a:p>
+                      <a:r>
+                        <a:rPr sz="1100"/>
+                        <a:t>SOC2</a:t>
+                      </a:r>
+                    </a:p>
+                  </a:txBody>
+                  <a:tcPr>
+                    <a:solidFill>
+                      <a:srgbClr val="E7E6E6"/>
+                    </a:solidFill>
+                  </a:tcPr>
+                </a:tc>
+              </a:tr>
+              <a:tr h="370840">
+                <a:tc>
+                  <a:txBody>
+                    <a:bodyPr/>
+                    <a:lstStyle/>
+                    <a:p>
+                      <a:r>
+                        <a:rPr sz="1100"/>
+                        <a:t>Performance</a:t>
+                      </a:r>
+                    </a:p>
+                  </a:txBody>
+                  <a:tcPr>
+                    <a:solidFill>
+                      <a:srgbClr val="E7E6E6"/>
+                    </a:solidFill>
+                  </a:tcPr>
+                </a:tc>
+                <a:tc>
+                  <a:txBody>
+                    <a:bodyPr/>
+                    <a:lstStyle/>
+                    <a:p>
+                      <a:r>
+                        <a:rPr sz="1100"/>
+                        <a:t>Accuracy Requirements</a:t>
+                      </a:r>
+                    </a:p>
+                  </a:txBody>
+                  <a:tcPr>
+                    <a:solidFill>
+                      <a:srgbClr val="E7E6E6"/>
+                    </a:solidFill>
+                  </a:tcPr>
+                </a:tc>
+                <a:tc>
+                  <a:txBody>
+                    <a:bodyPr/>
+                    <a:lstStyle/>
+                    <a:p>
+                      <a:r>
+                        <a:rPr sz="1100"/>
+                        <a:t>95%+ extraction accuracy</a:t>
+                      </a:r>
+                    </a:p>
+                  </a:txBody>
+                  <a:tcPr>
+                    <a:solidFill>
+                      <a:srgbClr val="E7E6E6"/>
+                    </a:solidFill>
+                  </a:tcPr>
+                </a:tc>
+              </a:tr>
+              <a:tr h="370840">
+                <a:tc>
+                  <a:txBody>
+                    <a:bodyPr/>
+                    <a:lstStyle/>
+                    <a:p>
+                      <a:r>
+                        <a:rPr sz="1100"/>
+                        <a:t>Performance</a:t>
+                      </a:r>
+                    </a:p>
+                  </a:txBody>
+                  <a:tcPr>
+                    <a:solidFill>
+                      <a:srgbClr val="E7E6E6"/>
+                    </a:solidFill>
+                  </a:tcPr>
+                </a:tc>
+                <a:tc>
+                  <a:txBody>
+                    <a:bodyPr/>
+                    <a:lstStyle/>
+                    <a:p>
+                      <a:r>
+                        <a:rPr sz="1100"/>
+                        <a:t>Processing Speed</a:t>
+                      </a:r>
+                    </a:p>
+                  </a:txBody>
+                  <a:tcPr>
+                    <a:solidFill>
+                      <a:srgbClr val="E7E6E6"/>
+                    </a:solidFill>
+                  </a:tcPr>
+                </a:tc>
+                <a:tc>
+                  <a:txBody>
+                    <a:bodyPr/>
+                    <a:lstStyle/>
+                    <a:p>
+                      <a:r>
+                        <a:rPr sz="1100"/>
+                        <a:t>Batch processing</a:t>
+                      </a:r>
+                    </a:p>
+                  </a:txBody>
+                  <a:tcPr>
+                    <a:solidFill>
+                      <a:srgbClr val="E7E6E6"/>
+                    </a:solidFill>
+                  </a:tcPr>
+                </a:tc>
+              </a:tr>
+              <a:tr h="370840">
+                <a:tc>
+                  <a:txBody>
+                    <a:bodyPr/>
+                    <a:lstStyle/>
+                    <a:p>
+                      <a:r>
+                        <a:rPr sz="1100"/>
+                        <a:t>Environment</a:t>
+                      </a:r>
+                    </a:p>
+                  </a:txBody>
+                  <a:tcPr>
+                    <a:solidFill>
+                      <a:srgbClr val="E7E6E6"/>
+                    </a:solidFill>
+                  </a:tcPr>
+                </a:tc>
+                <a:tc>
+                  <a:txBody>
+                    <a:bodyPr/>
+                    <a:lstStyle/>
+                    <a:p>
+                      <a:r>
+                        <a:rPr sz="1100"/>
+                        <a:t>Deployment Environments</a:t>
+                      </a:r>
+                    </a:p>
+                  </a:txBody>
+                  <a:tcPr>
+                    <a:solidFill>
+                      <a:srgbClr val="E7E6E6"/>
+                    </a:solidFill>
+                  </a:tcPr>
+                </a:tc>
+                <a:tc>
+                  <a:txBody>
+                    <a:bodyPr/>
+                    <a:lstStyle/>
+                    <a:p>
+                      <a:r>
+                        <a:rPr sz="1100"/>
+                        <a:t>2 environments (dev prod)</a:t>
+                      </a:r>
+                    </a:p>
+                  </a:txBody>
+                  <a:tcPr>
+                    <a:solidFill>
+                      <a:srgbClr val="E7E6E6"/>
+                    </a:solidFill>
+                  </a:tcPr>
+                </a:tc>
+              </a:tr>
+            </a:tbl>
+          </a:graphicData>
+        </a:graphic>
+      </p:graphicFrame>
+      <p:pic>
+        <p:nvPicPr>
+          <p:cNvPr id="5" name="Picture 4" descr="eo-framework-logo-real.png"/>
+          <p:cNvPicPr>
+            <a:picLocks noChangeAspect="1"/>
+          </p:cNvPicPr>
+          <p:nvPr/>
+        </p:nvPicPr>
+        <p:blipFill>
+          <a:blip r:embed="rId3"/>
+          <a:stretch>
+            <a:fillRect/>
+          </a:stretch>
+        </p:blipFill>
+        <p:spPr>
+          <a:xfrm>
+            <a:off x="6684264" y="4535424"/>
+            <a:ext cx="2139696" cy="530352"/>
+          </a:xfrm>
+          <a:prstGeom prst="rect">
+            <a:avLst/>
+          </a:prstGeom>
+        </p:spPr>
+      </p:pic>
+    </p:spTree>
+  </p:cSld>
+  <p:clrMapOvr>
+    <a:masterClrMapping/>
+  </p:clrMapOvr>
+</p:sld>
+</file>
+
+<file path=ppt/slides/slide4.xml><?xml version="1.0" encoding="utf-8"?>
+<p:sld xmlns:a="http://schemas.openxmlformats.org/drawingml/2006/main" xmlns:p="http://schemas.openxmlformats.org/presentationml/2006/main" xmlns:r="http://schemas.openxmlformats.org/officeDocument/2006/relationships">
+  <p:cSld>
+    <p:spTree>
+      <p:nvGrpSpPr>
+        <p:cNvPr id="1" name=""/>
+        <p:cNvGrpSpPr/>
+        <p:nvPr/>
+      </p:nvGrpSpPr>
+      <p:grpSpPr/>
+      <p:sp>
+        <p:nvSpPr>
+          <p:cNvPr id="2" name="Text Placeholder 1"/>
+          <p:cNvSpPr>
+            <a:spLocks noGrp="1"/>
+          </p:cNvSpPr>
+          <p:nvPr>
+            <p:ph type="body" idx="10" sz="quarter"/>
+          </p:nvPr>
+        </p:nvSpPr>
+        <p:spPr/>
+        <p:txBody>
+          <a:bodyPr/>
+          <a:lstStyle/>
+          <a:p>
             <a:r>
               <a:t>Solution Overview</a:t>
             </a:r>
@@ -3791,19 +4986,19 @@
           <a:p>
             <a:pPr lvl="1"/>
             <a:r>
-              <a:t>Azure AI Document Intelligence for OCR and intelligent form/table extraction from documents</a:t>
+              <a:t>Azure Document Intelligence for OCR, layout analysis, and structured data extraction</a:t>
             </a:r>
           </a:p>
           <a:p>
             <a:pPr lvl="1"/>
             <a:r>
-              <a:t>Azure Cognitive Services Text Analytics for NLP entity recognition and document classification</a:t>
+              <a:t>Pre-built models for invoices, receipts, contracts, and identity documents</a:t>
             </a:r>
           </a:p>
           <a:p>
             <a:pPr lvl="1"/>
             <a:r>
-              <a:t>Azure AI Custom Vision for document classification and quality assurance on low-confidence results</a:t>
+              <a:t>Custom models trained on your specific document types and business rules</a:t>
             </a:r>
           </a:p>
           <a:p>
@@ -3816,19 +5011,25 @@
           <a:p>
             <a:pPr lvl="1"/>
             <a:r>
-              <a:t>Serverless processing with Azure Functions and Logic Apps for scalable workflows</a:t>
+              <a:t>Azure Functions for serverless document processing workflows</a:t>
             </a:r>
           </a:p>
           <a:p>
             <a:pPr lvl="1"/>
             <a:r>
-              <a:t>Blob Storage, Cosmos DB metadata, and API Management for integration</a:t>
+              <a:t>Cosmos DB for scalable metadata storage and extraction results</a:t>
             </a:r>
           </a:p>
           <a:p>
             <a:pPr lvl="1"/>
             <a:r>
-              <a:t>Azure Monitor and Application Insights for compliance and audit logging</a:t>
+              <a:t>Logic Apps and Power Automate for business process integration</a:t>
+            </a:r>
+          </a:p>
+          <a:p>
+            <a:pPr lvl="1"/>
+            <a:r>
+              <a:t>Azure Blob Storage for secure document ingestion and archival</a:t>
             </a:r>
           </a:p>
         </p:txBody>
@@ -3851,179 +5052,6 @@
           <a:xfrm>
             <a:off x="5331876" y="685799"/>
             <a:ext cx="2998274" cy="3815859"/>
-          </a:xfrm>
-          <a:prstGeom prst="rect">
-            <a:avLst/>
-          </a:prstGeom>
-        </p:spPr>
-      </p:pic>
-    </p:spTree>
-  </p:cSld>
-  <p:clrMapOvr>
-    <a:masterClrMapping/>
-  </p:clrMapOvr>
-</p:sld>
-</file>
-
-<file path=ppt/slides/slide4.xml><?xml version="1.0" encoding="utf-8"?>
-<p:sld xmlns:a="http://schemas.openxmlformats.org/drawingml/2006/main" xmlns:p="http://schemas.openxmlformats.org/presentationml/2006/main" xmlns:r="http://schemas.openxmlformats.org/officeDocument/2006/relationships">
-  <p:cSld>
-    <p:spTree>
-      <p:nvGrpSpPr>
-        <p:cNvPr id="1" name=""/>
-        <p:cNvGrpSpPr/>
-        <p:nvPr/>
-      </p:nvGrpSpPr>
-      <p:grpSpPr/>
-      <p:sp>
-        <p:nvSpPr>
-          <p:cNvPr id="2" name="Text Placeholder 1"/>
-          <p:cNvSpPr>
-            <a:spLocks noGrp="1"/>
-          </p:cNvSpPr>
-          <p:nvPr>
-            <p:ph type="body" idx="10" sz="quarter"/>
-          </p:nvPr>
-        </p:nvSpPr>
-        <p:spPr/>
-        <p:txBody>
-          <a:bodyPr/>
-          <a:lstStyle/>
-          <a:p>
-            <a:r>
-              <a:t>Implementation Approach</a:t>
-            </a:r>
-          </a:p>
-        </p:txBody>
-      </p:sp>
-      <p:pic>
-        <p:nvPicPr>
-          <p:cNvPr id="3" name="Picture Placeholder 2" descr="consulting_company_logo.png"/>
-          <p:cNvPicPr>
-            <a:picLocks noGrp="1" noChangeAspect="1"/>
-          </p:cNvPicPr>
-          <p:nvPr>
-            <p:ph type="pic" idx="13" sz="quarter"/>
-          </p:nvPr>
-        </p:nvPicPr>
-        <p:blipFill>
-          <a:blip r:embed="rId2"/>
-          <a:srcRect t="6762" b="6762"/>
-          <a:stretch>
-            <a:fillRect/>
-          </a:stretch>
-        </p:blipFill>
-        <p:spPr/>
-      </p:pic>
-      <p:sp>
-        <p:nvSpPr>
-          <p:cNvPr id="4" name="Text Placeholder 3"/>
-          <p:cNvSpPr>
-            <a:spLocks noGrp="1"/>
-          </p:cNvSpPr>
-          <p:nvPr>
-            <p:ph type="body" idx="14" sz="quarter"/>
-          </p:nvPr>
-        </p:nvSpPr>
-        <p:spPr/>
-        <p:txBody>
-          <a:bodyPr/>
-          <a:lstStyle/>
-          <a:p>
-            <a:pPr/>
-            <a:r>
-              <a:rPr b="1"/>
-              <a:t>Phase 1: Pilot (Months 1-2)</a:t>
-            </a:r>
-          </a:p>
-          <a:p>
-            <a:pPr lvl="1"/>
-            <a:r>
-              <a:t>Deploy single document type to validate AI accuracy and business value</a:t>
-            </a:r>
-          </a:p>
-          <a:p>
-            <a:pPr lvl="1"/>
-            <a:r>
-              <a:t>Configure Document Intelligence/Text Analytics models with sample documents</a:t>
-            </a:r>
-          </a:p>
-          <a:p>
-            <a:pPr lvl="1"/>
-            <a:r>
-              <a:t>Establish human review workflow and quality benchmarks</a:t>
-            </a:r>
-          </a:p>
-          <a:p>
-            <a:pPr/>
-            <a:r>
-              <a:rPr b="1"/>
-              <a:t>Phase 2: Expansion (Months 3-4)</a:t>
-            </a:r>
-          </a:p>
-          <a:p>
-            <a:pPr lvl="1"/>
-            <a:r>
-              <a:t>Extend to additional document types and higher volumes</a:t>
-            </a:r>
-          </a:p>
-          <a:p>
-            <a:pPr lvl="1"/>
-            <a:r>
-              <a:t>Implement API integrations with downstream business systems</a:t>
-            </a:r>
-          </a:p>
-          <a:p>
-            <a:pPr lvl="1"/>
-            <a:r>
-              <a:t>Configure automated routing and exception handling</a:t>
-            </a:r>
-          </a:p>
-          <a:p>
-            <a:pPr/>
-            <a:r>
-              <a:rPr b="1"/>
-              <a:t>Phase 3: Optimization (Months 5-6)</a:t>
-            </a:r>
-          </a:p>
-          <a:p>
-            <a:pPr lvl="1"/>
-            <a:r>
-              <a:t>Fine-tune AI models based on production data and feedback</a:t>
-            </a:r>
-          </a:p>
-          <a:p>
-            <a:pPr lvl="1"/>
-            <a:r>
-              <a:t>Implement advanced features like multi-language support</a:t>
-            </a:r>
-          </a:p>
-          <a:p>
-            <a:pPr lvl="1"/>
-            <a:r>
-              <a:t>Complete training and transition to operations team</a:t>
-            </a:r>
-          </a:p>
-        </p:txBody>
-      </p:sp>
-      <p:pic>
-        <p:nvPicPr>
-          <p:cNvPr id="5" name="Picture 4" descr="eo-framework-logo-real.png"/>
-          <p:cNvPicPr>
-            <a:picLocks noChangeAspect="1"/>
-          </p:cNvPicPr>
-          <p:nvPr/>
-        </p:nvPicPr>
-        <p:blipFill>
-          <a:blip r:embed="rId3"/>
-          <a:stretch>
-            <a:fillRect/>
-          </a:stretch>
-        </p:blipFill>
-        <p:spPr>
-          <a:xfrm>
-            <a:off x="6684264" y="4535424"/>
-            <a:ext cx="2139696" cy="530352"/>
           </a:xfrm>
           <a:prstGeom prst="rect">
             <a:avLst/>
@@ -4063,10 +5091,8 @@
           <a:bodyPr/>
           <a:lstStyle/>
           <a:p>
-            <a:pPr algn="l"/>
-            <a:r>
-              <a:rPr b="1"/>
-              <a:t>Timeline &amp; Milestones</a:t>
+            <a:r>
+              <a:t>Implementation Approach</a:t>
             </a:r>
           </a:p>
         </p:txBody>
@@ -4083,339 +5109,104 @@
         </p:nvPicPr>
         <p:blipFill>
           <a:blip r:embed="rId2"/>
-          <a:srcRect t="6404" b="6404"/>
+          <a:srcRect t="6762" b="6762"/>
           <a:stretch>
             <a:fillRect/>
           </a:stretch>
         </p:blipFill>
         <p:spPr/>
       </p:pic>
-      <p:graphicFrame>
-        <p:nvGraphicFramePr>
-          <p:cNvPr id="4" name="Table Placeholder 3"/>
-          <p:cNvGraphicFramePr>
-            <a:graphicFrameLocks noGrp="1"/>
-          </p:cNvGraphicFramePr>
+      <p:sp>
+        <p:nvSpPr>
+          <p:cNvPr id="4" name="Text Placeholder 3"/>
+          <p:cNvSpPr>
+            <a:spLocks noGrp="1"/>
+          </p:cNvSpPr>
           <p:nvPr>
-            <p:ph type="tbl" idx="14" sz="quarter"/>
+            <p:ph type="body" idx="14" sz="quarter"/>
           </p:nvPr>
-        </p:nvGraphicFramePr>
-        <p:xfrm>
-          <a:off x="256855" y="677011"/>
-          <a:ext cx="8710931" cy="1483360"/>
-        </p:xfrm>
-        <a:graphic>
-          <a:graphicData uri="http://schemas.openxmlformats.org/drawingml/2006/table">
-            <a:tbl>
-              <a:tblPr firstRow="1" bandRow="1">
-                <a:tableStyleId>{5C22544A-7EE6-4342-B048-85BDC9FD1C3A}</a:tableStyleId>
-              </a:tblPr>
-              <a:tblGrid>
-                <a:gridCol w="871093"/>
-                <a:gridCol w="2177733"/>
-                <a:gridCol w="1306639"/>
-                <a:gridCol w="4355466"/>
-              </a:tblGrid>
-              <a:tr h="370840">
-                <a:tc>
-                  <a:txBody>
-                    <a:bodyPr/>
-                    <a:lstStyle/>
-                    <a:p>
-                      <a:r>
-                        <a:rPr sz="1400">
-                          <a:solidFill>
-                            <a:srgbClr val="FFFFFF"/>
-                          </a:solidFill>
-                        </a:rPr>
-                        <a:t>Phase No</a:t>
-                      </a:r>
-                    </a:p>
-                  </a:txBody>
-                  <a:tcPr>
-                    <a:solidFill>
-                      <a:srgbClr val="A01C02"/>
-                    </a:solidFill>
-                  </a:tcPr>
-                </a:tc>
-                <a:tc>
-                  <a:txBody>
-                    <a:bodyPr/>
-                    <a:lstStyle/>
-                    <a:p>
-                      <a:r>
-                        <a:rPr sz="1400">
-                          <a:solidFill>
-                            <a:srgbClr val="FFFFFF"/>
-                          </a:solidFill>
-                        </a:rPr>
-                        <a:t>Phase Description</a:t>
-                      </a:r>
-                    </a:p>
-                  </a:txBody>
-                  <a:tcPr>
-                    <a:solidFill>
-                      <a:srgbClr val="A01C02"/>
-                    </a:solidFill>
-                  </a:tcPr>
-                </a:tc>
-                <a:tc>
-                  <a:txBody>
-                    <a:bodyPr/>
-                    <a:lstStyle/>
-                    <a:p>
-                      <a:r>
-                        <a:rPr sz="1400">
-                          <a:solidFill>
-                            <a:srgbClr val="FFFFFF"/>
-                          </a:solidFill>
-                        </a:rPr>
-                        <a:t>Timeline</a:t>
-                      </a:r>
-                    </a:p>
-                  </a:txBody>
-                  <a:tcPr>
-                    <a:solidFill>
-                      <a:srgbClr val="A01C02"/>
-                    </a:solidFill>
-                  </a:tcPr>
-                </a:tc>
-                <a:tc>
-                  <a:txBody>
-                    <a:bodyPr/>
-                    <a:lstStyle/>
-                    <a:p>
-                      <a:r>
-                        <a:rPr sz="1400">
-                          <a:solidFill>
-                            <a:srgbClr val="FFFFFF"/>
-                          </a:solidFill>
-                        </a:rPr>
-                        <a:t>Key Deliverables</a:t>
-                      </a:r>
-                    </a:p>
-                  </a:txBody>
-                  <a:tcPr>
-                    <a:solidFill>
-                      <a:srgbClr val="A01C02"/>
-                    </a:solidFill>
-                  </a:tcPr>
-                </a:tc>
-              </a:tr>
-              <a:tr h="370840">
-                <a:tc>
-                  <a:txBody>
-                    <a:bodyPr/>
-                    <a:lstStyle/>
-                    <a:p>
-                      <a:r>
-                        <a:rPr sz="1100"/>
-                        <a:t>Phase 1</a:t>
-                      </a:r>
-                    </a:p>
-                  </a:txBody>
-                  <a:tcPr>
-                    <a:solidFill>
-                      <a:srgbClr val="E7E6E6"/>
-                    </a:solidFill>
-                  </a:tcPr>
-                </a:tc>
-                <a:tc>
-                  <a:txBody>
-                    <a:bodyPr/>
-                    <a:lstStyle/>
-                    <a:p>
-                      <a:r>
-                        <a:rPr sz="1100"/>
-                        <a:t>Pilot &amp; Validation</a:t>
-                      </a:r>
-                    </a:p>
-                  </a:txBody>
-                  <a:tcPr>
-                    <a:solidFill>
-                      <a:srgbClr val="E7E6E6"/>
-                    </a:solidFill>
-                  </a:tcPr>
-                </a:tc>
-                <a:tc>
-                  <a:txBody>
-                    <a:bodyPr/>
-                    <a:lstStyle/>
-                    <a:p>
-                      <a:r>
-                        <a:rPr sz="1100"/>
-                        <a:t>Months 1-2</a:t>
-                      </a:r>
-                    </a:p>
-                  </a:txBody>
-                  <a:tcPr>
-                    <a:solidFill>
-                      <a:srgbClr val="E7E6E6"/>
-                    </a:solidFill>
-                  </a:tcPr>
-                </a:tc>
-                <a:tc>
-                  <a:txBody>
-                    <a:bodyPr/>
-                    <a:lstStyle/>
-                    <a:p>
-                      <a:r>
-                        <a:rPr sz="1100"/>
-                        <a:t>Single document type automated, 95%+ accuracy validated, Human review workflow operational</a:t>
-                      </a:r>
-                    </a:p>
-                  </a:txBody>
-                  <a:tcPr>
-                    <a:solidFill>
-                      <a:srgbClr val="E7E6E6"/>
-                    </a:solidFill>
-                  </a:tcPr>
-                </a:tc>
-              </a:tr>
-              <a:tr h="370840">
-                <a:tc>
-                  <a:txBody>
-                    <a:bodyPr/>
-                    <a:lstStyle/>
-                    <a:p>
-                      <a:r>
-                        <a:rPr sz="1100"/>
-                        <a:t>Phase 2</a:t>
-                      </a:r>
-                    </a:p>
-                  </a:txBody>
-                  <a:tcPr>
-                    <a:solidFill>
-                      <a:srgbClr val="E7E6E6"/>
-                    </a:solidFill>
-                  </a:tcPr>
-                </a:tc>
-                <a:tc>
-                  <a:txBody>
-                    <a:bodyPr/>
-                    <a:lstStyle/>
-                    <a:p>
-                      <a:r>
-                        <a:rPr sz="1100"/>
-                        <a:t>Expansion &amp; Integration</a:t>
-                      </a:r>
-                    </a:p>
-                  </a:txBody>
-                  <a:tcPr>
-                    <a:solidFill>
-                      <a:srgbClr val="E7E6E6"/>
-                    </a:solidFill>
-                  </a:tcPr>
-                </a:tc>
-                <a:tc>
-                  <a:txBody>
-                    <a:bodyPr/>
-                    <a:lstStyle/>
-                    <a:p>
-                      <a:r>
-                        <a:rPr sz="1100"/>
-                        <a:t>Months 3-4</a:t>
-                      </a:r>
-                    </a:p>
-                  </a:txBody>
-                  <a:tcPr>
-                    <a:solidFill>
-                      <a:srgbClr val="E7E6E6"/>
-                    </a:solidFill>
-                  </a:tcPr>
-                </a:tc>
-                <a:tc>
-                  <a:txBody>
-                    <a:bodyPr/>
-                    <a:lstStyle/>
-                    <a:p>
-                      <a:r>
-                        <a:rPr sz="1100"/>
-                        <a:t>Multiple document types supported, API integrations live, Volume processing at scale</a:t>
-                      </a:r>
-                    </a:p>
-                  </a:txBody>
-                  <a:tcPr>
-                    <a:solidFill>
-                      <a:srgbClr val="E7E6E6"/>
-                    </a:solidFill>
-                  </a:tcPr>
-                </a:tc>
-              </a:tr>
-              <a:tr h="370840">
-                <a:tc>
-                  <a:txBody>
-                    <a:bodyPr/>
-                    <a:lstStyle/>
-                    <a:p>
-                      <a:r>
-                        <a:rPr sz="1100"/>
-                        <a:t>Phase 3</a:t>
-                      </a:r>
-                    </a:p>
-                  </a:txBody>
-                  <a:tcPr>
-                    <a:solidFill>
-                      <a:srgbClr val="E7E6E6"/>
-                    </a:solidFill>
-                  </a:tcPr>
-                </a:tc>
-                <a:tc>
-                  <a:txBody>
-                    <a:bodyPr/>
-                    <a:lstStyle/>
-                    <a:p>
-                      <a:r>
-                        <a:rPr sz="1100"/>
-                        <a:t>Optimization &amp; Handoff</a:t>
-                      </a:r>
-                    </a:p>
-                  </a:txBody>
-                  <a:tcPr>
-                    <a:solidFill>
-                      <a:srgbClr val="E7E6E6"/>
-                    </a:solidFill>
-                  </a:tcPr>
-                </a:tc>
-                <a:tc>
-                  <a:txBody>
-                    <a:bodyPr/>
-                    <a:lstStyle/>
-                    <a:p>
-                      <a:r>
-                        <a:rPr sz="1100"/>
-                        <a:t>Months 5-6</a:t>
-                      </a:r>
-                    </a:p>
-                  </a:txBody>
-                  <a:tcPr>
-                    <a:solidFill>
-                      <a:srgbClr val="E7E6E6"/>
-                    </a:solidFill>
-                  </a:tcPr>
-                </a:tc>
-                <a:tc>
-                  <a:txBody>
-                    <a:bodyPr/>
-                    <a:lstStyle/>
-                    <a:p>
-                      <a:r>
-                        <a:rPr sz="1100"/>
-                        <a:t>AI models fine-tuned, Advanced features deployed, Operations team trained</a:t>
-                      </a:r>
-                    </a:p>
-                  </a:txBody>
-                  <a:tcPr>
-                    <a:solidFill>
-                      <a:srgbClr val="E7E6E6"/>
-                    </a:solidFill>
-                  </a:tcPr>
-                </a:tc>
-              </a:tr>
-            </a:tbl>
-          </a:graphicData>
-        </a:graphic>
-      </p:graphicFrame>
+        </p:nvSpPr>
+        <p:spPr/>
+        <p:txBody>
+          <a:bodyPr/>
+          <a:lstStyle/>
+          <a:p>
+            <a:pPr/>
+            <a:r>
+              <a:rPr b="1"/>
+              <a:t>Phase 1: Foundation &amp; Model Training (Months 1-2)</a:t>
+            </a:r>
+          </a:p>
+          <a:p>
+            <a:pPr lvl="1"/>
+            <a:r>
+              <a:t>Deploy Azure Document Intelligence resource and configure security</a:t>
+            </a:r>
+          </a:p>
+          <a:p>
+            <a:pPr lvl="1"/>
+            <a:r>
+              <a:t>Analyze document samples and select appropriate pre-built models</a:t>
+            </a:r>
+          </a:p>
+          <a:p>
+            <a:pPr lvl="1"/>
+            <a:r>
+              <a:t>Train custom models for organization-specific document types</a:t>
+            </a:r>
+          </a:p>
+          <a:p>
+            <a:pPr/>
+            <a:r>
+              <a:rPr b="1"/>
+              <a:t>Phase 2: Pipeline Development (Months 3-4)</a:t>
+            </a:r>
+          </a:p>
+          <a:p>
+            <a:pPr lvl="1"/>
+            <a:r>
+              <a:t>Build serverless processing pipeline with Azure Functions</a:t>
+            </a:r>
+          </a:p>
+          <a:p>
+            <a:pPr lvl="1"/>
+            <a:r>
+              <a:t>Implement confidence scoring and human review workflows</a:t>
+            </a:r>
+          </a:p>
+          <a:p>
+            <a:pPr lvl="1"/>
+            <a:r>
+              <a:t>Integrate with downstream systems via Logic Apps and APIs</a:t>
+            </a:r>
+          </a:p>
+          <a:p>
+            <a:pPr/>
+            <a:r>
+              <a:rPr b="1"/>
+              <a:t>Phase 3: Optimization &amp; Scale (Months 5-6)</a:t>
+            </a:r>
+          </a:p>
+          <a:p>
+            <a:pPr lvl="1"/>
+            <a:r>
+              <a:t>Fine-tune models based on production accuracy metrics</a:t>
+            </a:r>
+          </a:p>
+          <a:p>
+            <a:pPr lvl="1"/>
+            <a:r>
+              <a:t>Implement advanced validation rules and exception handling</a:t>
+            </a:r>
+          </a:p>
+          <a:p>
+            <a:pPr lvl="1"/>
+            <a:r>
+              <a:t>Complete knowledge transfer and operations handover</a:t>
+            </a:r>
+          </a:p>
+        </p:txBody>
+      </p:sp>
       <p:pic>
         <p:nvPicPr>
           <p:cNvPr id="5" name="Picture 4" descr="eo-framework-logo-real.png"/>
@@ -4473,8 +5264,10 @@
           <a:bodyPr/>
           <a:lstStyle/>
           <a:p>
-            <a:r>
-              <a:t>Success Stories</a:t>
+            <a:pPr algn="l"/>
+            <a:r>
+              <a:rPr b="1"/>
+              <a:t>Timeline &amp; Milestones</a:t>
             </a:r>
           </a:p>
         </p:txBody>
@@ -4491,93 +5284,339 @@
         </p:nvPicPr>
         <p:blipFill>
           <a:blip r:embed="rId2"/>
-          <a:srcRect t="6762" b="6762"/>
+          <a:srcRect t="6404" b="6404"/>
           <a:stretch>
             <a:fillRect/>
           </a:stretch>
         </p:blipFill>
         <p:spPr/>
       </p:pic>
-      <p:sp>
-        <p:nvSpPr>
-          <p:cNvPr id="4" name="Text Placeholder 3"/>
-          <p:cNvSpPr>
-            <a:spLocks noGrp="1"/>
-          </p:cNvSpPr>
+      <p:graphicFrame>
+        <p:nvGraphicFramePr>
+          <p:cNvPr id="4" name="Table Placeholder 3"/>
+          <p:cNvGraphicFramePr>
+            <a:graphicFrameLocks noGrp="1"/>
+          </p:cNvGraphicFramePr>
           <p:nvPr>
-            <p:ph type="body" idx="14" sz="quarter"/>
+            <p:ph type="tbl" idx="14" sz="quarter"/>
           </p:nvPr>
-        </p:nvSpPr>
-        <p:spPr/>
-        <p:txBody>
-          <a:bodyPr/>
-          <a:lstStyle/>
-          <a:p>
-            <a:pPr/>
-            <a:r>
-              <a:rPr b="1"/>
-              <a:t>Client Success: Healthcare Insurance Provider</a:t>
-            </a:r>
-          </a:p>
-          <a:p>
-            <a:pPr lvl="1"/>
-            <a:r>
-              <a:rPr b="1"/>
-              <a:t>Client:</a:t>
-            </a:r>
-            <a:r>
-              <a:t> Regional health insurer processing 50,000+ claims monthly</a:t>
-            </a:r>
-          </a:p>
-          <a:p>
-            <a:pPr lvl="1"/>
-            <a:r>
-              <a:rPr b="1"/>
-              <a:t>Challenge:</a:t>
-            </a:r>
-            <a:r>
-              <a:t> Manual processing taking 24-48 hours, 8% error rate, high labor costs limiting scalability</a:t>
-            </a:r>
-          </a:p>
-          <a:p>
-            <a:pPr lvl="1"/>
-            <a:r>
-              <a:rPr b="1"/>
-              <a:t>Solution:</a:t>
-            </a:r>
-            <a:r>
-              <a:t> Azure AI Document Intelligence with Text Analytics and Custom Vision for automated claims processing</a:t>
-            </a:r>
-          </a:p>
-          <a:p>
-            <a:pPr lvl="1"/>
-            <a:r>
-              <a:rPr b="1"/>
-              <a:t>Results:</a:t>
-            </a:r>
-            <a:r>
-              <a:t> 92% faster processing (24hrs → 2hrs), 99.2% accuracy, $2.1M annual savings, ROI in 11 months</a:t>
-            </a:r>
-          </a:p>
-          <a:p>
-            <a:pPr lvl="1"/>
-            <a:r>
-              <a:rPr b="1"/>
-              <a:t>Testimonial:</a:t>
-            </a:r>
-            <a:r>
-              <a:t> "The AI accuracy exceeded our expectations. We've redeployed staff to complex cases requiring human judgment, dramatically improving both efficiency and job satisfaction." — </a:t>
-            </a:r>
-            <a:r>
-              <a:rPr b="1"/>
-              <a:t>Sarah Martinez, VP Operations</a:t>
-            </a:r>
-            <a:r>
-              <a:t>, HealthFirst Insurance</a:t>
-            </a:r>
-          </a:p>
-        </p:txBody>
-      </p:sp>
+        </p:nvGraphicFramePr>
+        <p:xfrm>
+          <a:off x="256855" y="677011"/>
+          <a:ext cx="8710931" cy="1483360"/>
+        </p:xfrm>
+        <a:graphic>
+          <a:graphicData uri="http://schemas.openxmlformats.org/drawingml/2006/table">
+            <a:tbl>
+              <a:tblPr firstRow="1" bandRow="1">
+                <a:tableStyleId>{5C22544A-7EE6-4342-B048-85BDC9FD1C3A}</a:tableStyleId>
+              </a:tblPr>
+              <a:tblGrid>
+                <a:gridCol w="871093"/>
+                <a:gridCol w="2177733"/>
+                <a:gridCol w="1306639"/>
+                <a:gridCol w="4355466"/>
+              </a:tblGrid>
+              <a:tr h="370840">
+                <a:tc>
+                  <a:txBody>
+                    <a:bodyPr/>
+                    <a:lstStyle/>
+                    <a:p>
+                      <a:r>
+                        <a:rPr sz="1400">
+                          <a:solidFill>
+                            <a:srgbClr val="FFFFFF"/>
+                          </a:solidFill>
+                        </a:rPr>
+                        <a:t>Phase No</a:t>
+                      </a:r>
+                    </a:p>
+                  </a:txBody>
+                  <a:tcPr>
+                    <a:solidFill>
+                      <a:srgbClr val="A01C02"/>
+                    </a:solidFill>
+                  </a:tcPr>
+                </a:tc>
+                <a:tc>
+                  <a:txBody>
+                    <a:bodyPr/>
+                    <a:lstStyle/>
+                    <a:p>
+                      <a:r>
+                        <a:rPr sz="1400">
+                          <a:solidFill>
+                            <a:srgbClr val="FFFFFF"/>
+                          </a:solidFill>
+                        </a:rPr>
+                        <a:t>Phase Description</a:t>
+                      </a:r>
+                    </a:p>
+                  </a:txBody>
+                  <a:tcPr>
+                    <a:solidFill>
+                      <a:srgbClr val="A01C02"/>
+                    </a:solidFill>
+                  </a:tcPr>
+                </a:tc>
+                <a:tc>
+                  <a:txBody>
+                    <a:bodyPr/>
+                    <a:lstStyle/>
+                    <a:p>
+                      <a:r>
+                        <a:rPr sz="1400">
+                          <a:solidFill>
+                            <a:srgbClr val="FFFFFF"/>
+                          </a:solidFill>
+                        </a:rPr>
+                        <a:t>Timeline</a:t>
+                      </a:r>
+                    </a:p>
+                  </a:txBody>
+                  <a:tcPr>
+                    <a:solidFill>
+                      <a:srgbClr val="A01C02"/>
+                    </a:solidFill>
+                  </a:tcPr>
+                </a:tc>
+                <a:tc>
+                  <a:txBody>
+                    <a:bodyPr/>
+                    <a:lstStyle/>
+                    <a:p>
+                      <a:r>
+                        <a:rPr sz="1400">
+                          <a:solidFill>
+                            <a:srgbClr val="FFFFFF"/>
+                          </a:solidFill>
+                        </a:rPr>
+                        <a:t>Key Deliverables</a:t>
+                      </a:r>
+                    </a:p>
+                  </a:txBody>
+                  <a:tcPr>
+                    <a:solidFill>
+                      <a:srgbClr val="A01C02"/>
+                    </a:solidFill>
+                  </a:tcPr>
+                </a:tc>
+              </a:tr>
+              <a:tr h="370840">
+                <a:tc>
+                  <a:txBody>
+                    <a:bodyPr/>
+                    <a:lstStyle/>
+                    <a:p>
+                      <a:r>
+                        <a:rPr sz="1100"/>
+                        <a:t>Phase 1</a:t>
+                      </a:r>
+                    </a:p>
+                  </a:txBody>
+                  <a:tcPr>
+                    <a:solidFill>
+                      <a:srgbClr val="E7E6E6"/>
+                    </a:solidFill>
+                  </a:tcPr>
+                </a:tc>
+                <a:tc>
+                  <a:txBody>
+                    <a:bodyPr/>
+                    <a:lstStyle/>
+                    <a:p>
+                      <a:r>
+                        <a:rPr sz="1100"/>
+                        <a:t>Foundation &amp; Model Training</a:t>
+                      </a:r>
+                    </a:p>
+                  </a:txBody>
+                  <a:tcPr>
+                    <a:solidFill>
+                      <a:srgbClr val="E7E6E6"/>
+                    </a:solidFill>
+                  </a:tcPr>
+                </a:tc>
+                <a:tc>
+                  <a:txBody>
+                    <a:bodyPr/>
+                    <a:lstStyle/>
+                    <a:p>
+                      <a:r>
+                        <a:rPr sz="1100"/>
+                        <a:t>Months 1-2</a:t>
+                      </a:r>
+                    </a:p>
+                  </a:txBody>
+                  <a:tcPr>
+                    <a:solidFill>
+                      <a:srgbClr val="E7E6E6"/>
+                    </a:solidFill>
+                  </a:tcPr>
+                </a:tc>
+                <a:tc>
+                  <a:txBody>
+                    <a:bodyPr/>
+                    <a:lstStyle/>
+                    <a:p>
+                      <a:r>
+                        <a:rPr sz="1100"/>
+                        <a:t>Azure environment configured, Document Intelligence models trained, Initial accuracy validated at 90%+</a:t>
+                      </a:r>
+                    </a:p>
+                  </a:txBody>
+                  <a:tcPr>
+                    <a:solidFill>
+                      <a:srgbClr val="E7E6E6"/>
+                    </a:solidFill>
+                  </a:tcPr>
+                </a:tc>
+              </a:tr>
+              <a:tr h="370840">
+                <a:tc>
+                  <a:txBody>
+                    <a:bodyPr/>
+                    <a:lstStyle/>
+                    <a:p>
+                      <a:r>
+                        <a:rPr sz="1100"/>
+                        <a:t>Phase 2</a:t>
+                      </a:r>
+                    </a:p>
+                  </a:txBody>
+                  <a:tcPr>
+                    <a:solidFill>
+                      <a:srgbClr val="E7E6E6"/>
+                    </a:solidFill>
+                  </a:tcPr>
+                </a:tc>
+                <a:tc>
+                  <a:txBody>
+                    <a:bodyPr/>
+                    <a:lstStyle/>
+                    <a:p>
+                      <a:r>
+                        <a:rPr sz="1100"/>
+                        <a:t>Pipeline Development</a:t>
+                      </a:r>
+                    </a:p>
+                  </a:txBody>
+                  <a:tcPr>
+                    <a:solidFill>
+                      <a:srgbClr val="E7E6E6"/>
+                    </a:solidFill>
+                  </a:tcPr>
+                </a:tc>
+                <a:tc>
+                  <a:txBody>
+                    <a:bodyPr/>
+                    <a:lstStyle/>
+                    <a:p>
+                      <a:r>
+                        <a:rPr sz="1100"/>
+                        <a:t>Months 3-4</a:t>
+                      </a:r>
+                    </a:p>
+                  </a:txBody>
+                  <a:tcPr>
+                    <a:solidFill>
+                      <a:srgbClr val="E7E6E6"/>
+                    </a:solidFill>
+                  </a:tcPr>
+                </a:tc>
+                <a:tc>
+                  <a:txBody>
+                    <a:bodyPr/>
+                    <a:lstStyle/>
+                    <a:p>
+                      <a:r>
+                        <a:rPr sz="1100"/>
+                        <a:t>Processing pipeline operational, LOB system integrations complete, Human review workflows functional</a:t>
+                      </a:r>
+                    </a:p>
+                  </a:txBody>
+                  <a:tcPr>
+                    <a:solidFill>
+                      <a:srgbClr val="E7E6E6"/>
+                    </a:solidFill>
+                  </a:tcPr>
+                </a:tc>
+              </a:tr>
+              <a:tr h="370840">
+                <a:tc>
+                  <a:txBody>
+                    <a:bodyPr/>
+                    <a:lstStyle/>
+                    <a:p>
+                      <a:r>
+                        <a:rPr sz="1100"/>
+                        <a:t>Phase 3</a:t>
+                      </a:r>
+                    </a:p>
+                  </a:txBody>
+                  <a:tcPr>
+                    <a:solidFill>
+                      <a:srgbClr val="E7E6E6"/>
+                    </a:solidFill>
+                  </a:tcPr>
+                </a:tc>
+                <a:tc>
+                  <a:txBody>
+                    <a:bodyPr/>
+                    <a:lstStyle/>
+                    <a:p>
+                      <a:r>
+                        <a:rPr sz="1100"/>
+                        <a:t>Optimization &amp; Scale</a:t>
+                      </a:r>
+                    </a:p>
+                  </a:txBody>
+                  <a:tcPr>
+                    <a:solidFill>
+                      <a:srgbClr val="E7E6E6"/>
+                    </a:solidFill>
+                  </a:tcPr>
+                </a:tc>
+                <a:tc>
+                  <a:txBody>
+                    <a:bodyPr/>
+                    <a:lstStyle/>
+                    <a:p>
+                      <a:r>
+                        <a:rPr sz="1100"/>
+                        <a:t>Months 5-6</a:t>
+                      </a:r>
+                    </a:p>
+                  </a:txBody>
+                  <a:tcPr>
+                    <a:solidFill>
+                      <a:srgbClr val="E7E6E6"/>
+                    </a:solidFill>
+                  </a:tcPr>
+                </a:tc>
+                <a:tc>
+                  <a:txBody>
+                    <a:bodyPr/>
+                    <a:lstStyle/>
+                    <a:p>
+                      <a:r>
+                        <a:rPr sz="1100"/>
+                        <a:t>Model accuracy optimized to 95%+, Full production deployment, Operations team trained and certified</a:t>
+                      </a:r>
+                    </a:p>
+                  </a:txBody>
+                  <a:tcPr>
+                    <a:solidFill>
+                      <a:srgbClr val="E7E6E6"/>
+                    </a:solidFill>
+                  </a:tcPr>
+                </a:tc>
+              </a:tr>
+            </a:tbl>
+          </a:graphicData>
+        </a:graphic>
+      </p:graphicFrame>
       <p:pic>
         <p:nvPicPr>
           <p:cNvPr id="5" name="Picture 4" descr="eo-framework-logo-real.png"/>
@@ -4636,7 +5675,7 @@
           <a:lstStyle/>
           <a:p>
             <a:r>
-              <a:t>Our Partnership Advantage</a:t>
+              <a:t>Success Stories</a:t>
             </a:r>
           </a:p>
         </p:txBody>
@@ -4648,12 +5687,12 @@
             <a:picLocks noGrp="1" noChangeAspect="1"/>
           </p:cNvPicPr>
           <p:nvPr>
-            <p:ph type="pic" idx="14" sz="quarter"/>
+            <p:ph type="pic" idx="13" sz="quarter"/>
           </p:nvPr>
         </p:nvPicPr>
         <p:blipFill>
           <a:blip r:embed="rId2"/>
-          <a:srcRect t="6314" b="6314"/>
+          <a:srcRect t="6762" b="6762"/>
           <a:stretch>
             <a:fillRect/>
           </a:stretch>
@@ -4667,7 +5706,7 @@
             <a:spLocks noGrp="1"/>
           </p:cNvSpPr>
           <p:nvPr>
-            <p:ph type="body" idx="16" sz="quarter"/>
+            <p:ph type="body" idx="14" sz="quarter"/>
           </p:nvPr>
         </p:nvSpPr>
         <p:spPr/>
@@ -4678,97 +5717,71 @@
             <a:pPr/>
             <a:r>
               <a:rPr b="1"/>
-              <a:t>What We Bring</a:t>
+              <a:t>Client Success: Regional Healthcare Provider</a:t>
             </a:r>
           </a:p>
           <a:p>
             <a:pPr lvl="1"/>
             <a:r>
-              <a:t>10+ years delivering Azure AI/ML solutions with proven results</a:t>
+              <a:rPr b="1"/>
+              <a:t>Client:</a:t>
+            </a:r>
+            <a:r>
+              <a:t> Mid-size healthcare network processing 50,000+ patient documents monthly</a:t>
             </a:r>
           </a:p>
           <a:p>
             <a:pPr lvl="1"/>
             <a:r>
-              <a:t>50+ successful Document Intelligence implementations across healthcare, finance, government</a:t>
+              <a:rPr b="1"/>
+              <a:t>Challenge:</a:t>
+            </a:r>
+            <a:r>
+              <a:t> 8 FTEs dedicated to manual data entry, 72-hour processing backlog, 15% error rate causing compliance issues</a:t>
             </a:r>
           </a:p>
           <a:p>
             <a:pPr lvl="1"/>
             <a:r>
-              <a:t>Microsoft Gold Partner with Azure Advanced Specialization</a:t>
+              <a:rPr b="1"/>
+              <a:t>Solution:</a:t>
+            </a:r>
+            <a:r>
+              <a:t> Deployed Azure Document Intelligence with custom models for patient intake forms, insurance claims, and medical records, integrated with Epic EHR system</a:t>
             </a:r>
           </a:p>
           <a:p>
             <a:pPr lvl="1"/>
             <a:r>
-              <a:t>Certified solutions architects with Document Intelligence/Text Analytics expertise</a:t>
+              <a:rPr b="1"/>
+              <a:t>Results:</a:t>
+            </a:r>
+            <a:r>
+              <a:t> 85% reduction in manual processing (6.8 FTE savings), processing time reduced from 72 hours to 4 hours, accuracy improved to 97%, $420K annual labor cost savings</a:t>
             </a:r>
           </a:p>
           <a:p>
             <a:pPr lvl="1"/>
             <a:r>
-              <a:t>Dedicated AI/ML practice with data scientists and ML engineers</a:t>
-            </a:r>
-          </a:p>
-        </p:txBody>
-      </p:sp>
-      <p:sp>
-        <p:nvSpPr>
-          <p:cNvPr id="5" name="Text Placeholder 4"/>
-          <p:cNvSpPr>
-            <a:spLocks noGrp="1"/>
-          </p:cNvSpPr>
-          <p:nvPr>
-            <p:ph type="body" idx="17" sz="quarter"/>
-          </p:nvPr>
-        </p:nvSpPr>
-        <p:spPr/>
-        <p:txBody>
-          <a:bodyPr/>
-          <a:lstStyle/>
-          <a:p>
-            <a:pPr/>
-            <a:r>
               <a:rPr b="1"/>
-              <a:t>Value to You</a:t>
-            </a:r>
-          </a:p>
-          <a:p>
-            <a:pPr lvl="1"/>
-            <a:r>
-              <a:t>Pre-built document processing templates accelerate deployment</a:t>
-            </a:r>
-          </a:p>
-          <a:p>
-            <a:pPr lvl="1"/>
-            <a:r>
-              <a:t>Proven AI model training methodology reduces time to accuracy</a:t>
-            </a:r>
-          </a:p>
-          <a:p>
-            <a:pPr lvl="1"/>
-            <a:r>
-              <a:t>Direct Microsoft Azure specialist support through partner network</a:t>
-            </a:r>
-          </a:p>
-          <a:p>
-            <a:pPr lvl="1"/>
-            <a:r>
-              <a:t>Best practices from 50+ implementations avoid common pitfalls</a:t>
-            </a:r>
-          </a:p>
-          <a:p>
-            <a:pPr lvl="1"/>
-            <a:r>
-              <a:t>Comprehensive training ensures team self-sufficiency</a:t>
+              <a:t>Testimonial:</a:t>
+            </a:r>
+            <a:r>
+              <a:t> "Azure Document Intelligence transformed our patient onboarding process. What used to take our team 3 days now happens in hours, and with better accuracy. The integration with Epic was seamless." — </a:t>
+            </a:r>
+            <a:r>
+              <a:rPr b="1"/>
+              <a:t>Sarah Mitchell, VP of Operations</a:t>
+            </a:r>
+            <a:r>
+              <a:t>, Regional Healthcare Network</a:t>
             </a:r>
           </a:p>
         </p:txBody>
       </p:sp>
       <p:pic>
         <p:nvPicPr>
-          <p:cNvPr id="6" name="Picture 5" descr="eo-framework-logo-real.png"/>
+          <p:cNvPr id="5" name="Picture 4" descr="eo-framework-logo-real.png"/>
           <p:cNvPicPr>
             <a:picLocks noChangeAspect="1"/>
           </p:cNvPicPr>
@@ -4823,10 +5836,8 @@
           <a:bodyPr/>
           <a:lstStyle/>
           <a:p>
-            <a:pPr algn="l"/>
-            <a:r>
-              <a:rPr b="1"/>
-              <a:t>Investment Summary</a:t>
+            <a:r>
+              <a:t>Our Partnership Advantage</a:t>
             </a:r>
           </a:p>
         </p:txBody>
@@ -4838,808 +5849,127 @@
             <a:picLocks noGrp="1" noChangeAspect="1"/>
           </p:cNvPicPr>
           <p:nvPr>
-            <p:ph type="pic" idx="13" sz="quarter"/>
+            <p:ph type="pic" idx="14" sz="quarter"/>
           </p:nvPr>
         </p:nvPicPr>
         <p:blipFill>
           <a:blip r:embed="rId2"/>
-          <a:srcRect t="6404" b="6404"/>
+          <a:srcRect t="6314" b="6314"/>
           <a:stretch>
             <a:fillRect/>
           </a:stretch>
         </p:blipFill>
         <p:spPr/>
       </p:pic>
-      <p:graphicFrame>
-        <p:nvGraphicFramePr>
-          <p:cNvPr id="4" name="Table Placeholder 3"/>
-          <p:cNvGraphicFramePr>
-            <a:graphicFrameLocks noGrp="1"/>
-          </p:cNvGraphicFramePr>
+      <p:sp>
+        <p:nvSpPr>
+          <p:cNvPr id="4" name="Text Placeholder 3"/>
+          <p:cNvSpPr>
+            <a:spLocks noGrp="1"/>
+          </p:cNvSpPr>
           <p:nvPr>
-            <p:ph type="tbl" idx="14" sz="quarter"/>
+            <p:ph type="body" idx="16" sz="quarter"/>
           </p:nvPr>
-        </p:nvGraphicFramePr>
-        <p:xfrm>
-          <a:off x="256855" y="677011"/>
-          <a:ext cx="8710929" cy="2225040"/>
-        </p:xfrm>
-        <a:graphic>
-          <a:graphicData uri="http://schemas.openxmlformats.org/drawingml/2006/table">
-            <a:tbl>
-              <a:tblPr firstRow="1" bandRow="1">
-                <a:tableStyleId>{5C22544A-7EE6-4342-B048-85BDC9FD1C3A}</a:tableStyleId>
-              </a:tblPr>
-              <a:tblGrid>
-                <a:gridCol w="1742186"/>
-                <a:gridCol w="1045311"/>
-                <a:gridCol w="2003514"/>
-                <a:gridCol w="1132421"/>
-                <a:gridCol w="871093"/>
-                <a:gridCol w="871093"/>
-                <a:gridCol w="1045311"/>
-              </a:tblGrid>
-              <a:tr h="370840">
-                <a:tc>
-                  <a:txBody>
-                    <a:bodyPr/>
-                    <a:lstStyle/>
-                    <a:p>
-                      <a:r>
-                        <a:rPr sz="1400">
-                          <a:solidFill>
-                            <a:srgbClr val="FFFFFF"/>
-                          </a:solidFill>
-                        </a:rPr>
-                        <a:t>Cost Category</a:t>
-                      </a:r>
-                    </a:p>
-                  </a:txBody>
-                  <a:tcPr>
-                    <a:solidFill>
-                      <a:srgbClr val="A01C02"/>
-                    </a:solidFill>
-                  </a:tcPr>
-                </a:tc>
-                <a:tc>
-                  <a:txBody>
-                    <a:bodyPr/>
-                    <a:lstStyle/>
-                    <a:p>
-                      <a:r>
-                        <a:rPr sz="1400">
-                          <a:solidFill>
-                            <a:srgbClr val="FFFFFF"/>
-                          </a:solidFill>
-                        </a:rPr>
-                        <a:t>Year 1 List</a:t>
-                      </a:r>
-                    </a:p>
-                  </a:txBody>
-                  <a:tcPr>
-                    <a:solidFill>
-                      <a:srgbClr val="A01C02"/>
-                    </a:solidFill>
-                  </a:tcPr>
-                </a:tc>
-                <a:tc>
-                  <a:txBody>
-                    <a:bodyPr/>
-                    <a:lstStyle/>
-                    <a:p>
-                      <a:r>
-                        <a:rPr sz="1400">
-                          <a:solidFill>
-                            <a:srgbClr val="FFFFFF"/>
-                          </a:solidFill>
-                        </a:rPr>
-                        <a:t>Provider/Partner Credits</a:t>
-                      </a:r>
-                    </a:p>
-                  </a:txBody>
-                  <a:tcPr>
-                    <a:solidFill>
-                      <a:srgbClr val="A01C02"/>
-                    </a:solidFill>
-                  </a:tcPr>
-                </a:tc>
-                <a:tc>
-                  <a:txBody>
-                    <a:bodyPr/>
-                    <a:lstStyle/>
-                    <a:p>
-                      <a:r>
-                        <a:rPr sz="1400">
-                          <a:solidFill>
-                            <a:srgbClr val="FFFFFF"/>
-                          </a:solidFill>
-                        </a:rPr>
-                        <a:t>Year 1 Net</a:t>
-                      </a:r>
-                    </a:p>
-                  </a:txBody>
-                  <a:tcPr>
-                    <a:solidFill>
-                      <a:srgbClr val="A01C02"/>
-                    </a:solidFill>
-                  </a:tcPr>
-                </a:tc>
-                <a:tc>
-                  <a:txBody>
-                    <a:bodyPr/>
-                    <a:lstStyle/>
-                    <a:p>
-                      <a:r>
-                        <a:rPr sz="1400">
-                          <a:solidFill>
-                            <a:srgbClr val="FFFFFF"/>
-                          </a:solidFill>
-                        </a:rPr>
-                        <a:t>Year 2</a:t>
-                      </a:r>
-                    </a:p>
-                  </a:txBody>
-                  <a:tcPr>
-                    <a:solidFill>
-                      <a:srgbClr val="A01C02"/>
-                    </a:solidFill>
-                  </a:tcPr>
-                </a:tc>
-                <a:tc>
-                  <a:txBody>
-                    <a:bodyPr/>
-                    <a:lstStyle/>
-                    <a:p>
-                      <a:r>
-                        <a:rPr sz="1400">
-                          <a:solidFill>
-                            <a:srgbClr val="FFFFFF"/>
-                          </a:solidFill>
-                        </a:rPr>
-                        <a:t>Year 3</a:t>
-                      </a:r>
-                    </a:p>
-                  </a:txBody>
-                  <a:tcPr>
-                    <a:solidFill>
-                      <a:srgbClr val="A01C02"/>
-                    </a:solidFill>
-                  </a:tcPr>
-                </a:tc>
-                <a:tc>
-                  <a:txBody>
-                    <a:bodyPr/>
-                    <a:lstStyle/>
-                    <a:p>
-                      <a:r>
-                        <a:rPr sz="1400">
-                          <a:solidFill>
-                            <a:srgbClr val="FFFFFF"/>
-                          </a:solidFill>
-                        </a:rPr>
-                        <a:t>3-Year Total</a:t>
-                      </a:r>
-                    </a:p>
-                  </a:txBody>
-                  <a:tcPr>
-                    <a:solidFill>
-                      <a:srgbClr val="A01C02"/>
-                    </a:solidFill>
-                  </a:tcPr>
-                </a:tc>
-              </a:tr>
-              <a:tr h="370840">
-                <a:tc>
-                  <a:txBody>
-                    <a:bodyPr/>
-                    <a:lstStyle/>
-                    <a:p>
-                      <a:r>
-                        <a:rPr sz="1100"/>
-                        <a:t>Cloud Infrastructure</a:t>
-                      </a:r>
-                    </a:p>
-                  </a:txBody>
-                  <a:tcPr>
-                    <a:solidFill>
-                      <a:srgbClr val="E7E6E6"/>
-                    </a:solidFill>
-                  </a:tcPr>
-                </a:tc>
-                <a:tc>
-                  <a:txBody>
-                    <a:bodyPr/>
-                    <a:lstStyle/>
-                    <a:p>
-                      <a:r>
-                        <a:rPr sz="1100"/>
-                        <a:t>$18,528</a:t>
-                      </a:r>
-                    </a:p>
-                  </a:txBody>
-                  <a:tcPr>
-                    <a:solidFill>
-                      <a:srgbClr val="E7E6E6"/>
-                    </a:solidFill>
-                  </a:tcPr>
-                </a:tc>
-                <a:tc>
-                  <a:txBody>
-                    <a:bodyPr/>
-                    <a:lstStyle/>
-                    <a:p>
-                      <a:r>
-                        <a:rPr sz="1100"/>
-                        <a:t>($3,690)</a:t>
-                      </a:r>
-                    </a:p>
-                  </a:txBody>
-                  <a:tcPr>
-                    <a:solidFill>
-                      <a:srgbClr val="E7E6E6"/>
-                    </a:solidFill>
-                  </a:tcPr>
-                </a:tc>
-                <a:tc>
-                  <a:txBody>
-                    <a:bodyPr/>
-                    <a:lstStyle/>
-                    <a:p>
-                      <a:r>
-                        <a:rPr sz="1100"/>
-                        <a:t>$14,838</a:t>
-                      </a:r>
-                    </a:p>
-                  </a:txBody>
-                  <a:tcPr>
-                    <a:solidFill>
-                      <a:srgbClr val="E7E6E6"/>
-                    </a:solidFill>
-                  </a:tcPr>
-                </a:tc>
-                <a:tc>
-                  <a:txBody>
-                    <a:bodyPr/>
-                    <a:lstStyle/>
-                    <a:p>
-                      <a:r>
-                        <a:rPr sz="1100"/>
-                        <a:t>$18,528</a:t>
-                      </a:r>
-                    </a:p>
-                  </a:txBody>
-                  <a:tcPr>
-                    <a:solidFill>
-                      <a:srgbClr val="E7E6E6"/>
-                    </a:solidFill>
-                  </a:tcPr>
-                </a:tc>
-                <a:tc>
-                  <a:txBody>
-                    <a:bodyPr/>
-                    <a:lstStyle/>
-                    <a:p>
-                      <a:r>
-                        <a:rPr sz="1100"/>
-                        <a:t>$18,528</a:t>
-                      </a:r>
-                    </a:p>
-                  </a:txBody>
-                  <a:tcPr>
-                    <a:solidFill>
-                      <a:srgbClr val="E7E6E6"/>
-                    </a:solidFill>
-                  </a:tcPr>
-                </a:tc>
-                <a:tc>
-                  <a:txBody>
-                    <a:bodyPr/>
-                    <a:lstStyle/>
-                    <a:p>
-                      <a:r>
-                        <a:rPr sz="1100"/>
-                        <a:t>$51,894</a:t>
-                      </a:r>
-                    </a:p>
-                  </a:txBody>
-                  <a:tcPr>
-                    <a:solidFill>
-                      <a:srgbClr val="E7E6E6"/>
-                    </a:solidFill>
-                  </a:tcPr>
-                </a:tc>
-              </a:tr>
-              <a:tr h="370840">
-                <a:tc>
-                  <a:txBody>
-                    <a:bodyPr/>
-                    <a:lstStyle/>
-                    <a:p>
-                      <a:r>
-                        <a:rPr sz="1100"/>
-                        <a:t>Professional Services</a:t>
-                      </a:r>
-                    </a:p>
-                  </a:txBody>
-                  <a:tcPr>
-                    <a:solidFill>
-                      <a:srgbClr val="E7E6E6"/>
-                    </a:solidFill>
-                  </a:tcPr>
-                </a:tc>
-                <a:tc>
-                  <a:txBody>
-                    <a:bodyPr/>
-                    <a:lstStyle/>
-                    <a:p>
-                      <a:r>
-                        <a:rPr sz="1100"/>
-                        <a:t>$82,250</a:t>
-                      </a:r>
-                    </a:p>
-                  </a:txBody>
-                  <a:tcPr>
-                    <a:solidFill>
-                      <a:srgbClr val="E7E6E6"/>
-                    </a:solidFill>
-                  </a:tcPr>
-                </a:tc>
-                <a:tc>
-                  <a:txBody>
-                    <a:bodyPr/>
-                    <a:lstStyle/>
-                    <a:p>
-                      <a:r>
-                        <a:rPr sz="1100"/>
-                        <a:t>($10,000)</a:t>
-                      </a:r>
-                    </a:p>
-                  </a:txBody>
-                  <a:tcPr>
-                    <a:solidFill>
-                      <a:srgbClr val="E7E6E6"/>
-                    </a:solidFill>
-                  </a:tcPr>
-                </a:tc>
-                <a:tc>
-                  <a:txBody>
-                    <a:bodyPr/>
-                    <a:lstStyle/>
-                    <a:p>
-                      <a:r>
-                        <a:rPr sz="1100"/>
-                        <a:t>$72,250</a:t>
-                      </a:r>
-                    </a:p>
-                  </a:txBody>
-                  <a:tcPr>
-                    <a:solidFill>
-                      <a:srgbClr val="E7E6E6"/>
-                    </a:solidFill>
-                  </a:tcPr>
-                </a:tc>
-                <a:tc>
-                  <a:txBody>
-                    <a:bodyPr/>
-                    <a:lstStyle/>
-                    <a:p>
-                      <a:r>
-                        <a:rPr sz="1100"/>
-                        <a:t>$0</a:t>
-                      </a:r>
-                    </a:p>
-                  </a:txBody>
-                  <a:tcPr>
-                    <a:solidFill>
-                      <a:srgbClr val="E7E6E6"/>
-                    </a:solidFill>
-                  </a:tcPr>
-                </a:tc>
-                <a:tc>
-                  <a:txBody>
-                    <a:bodyPr/>
-                    <a:lstStyle/>
-                    <a:p>
-                      <a:r>
-                        <a:rPr sz="1100"/>
-                        <a:t>$0</a:t>
-                      </a:r>
-                    </a:p>
-                  </a:txBody>
-                  <a:tcPr>
-                    <a:solidFill>
-                      <a:srgbClr val="E7E6E6"/>
-                    </a:solidFill>
-                  </a:tcPr>
-                </a:tc>
-                <a:tc>
-                  <a:txBody>
-                    <a:bodyPr/>
-                    <a:lstStyle/>
-                    <a:p>
-                      <a:r>
-                        <a:rPr sz="1100"/>
-                        <a:t>$72,250</a:t>
-                      </a:r>
-                    </a:p>
-                  </a:txBody>
-                  <a:tcPr>
-                    <a:solidFill>
-                      <a:srgbClr val="E7E6E6"/>
-                    </a:solidFill>
-                  </a:tcPr>
-                </a:tc>
-              </a:tr>
-              <a:tr h="370840">
-                <a:tc>
-                  <a:txBody>
-                    <a:bodyPr/>
-                    <a:lstStyle/>
-                    <a:p>
-                      <a:r>
-                        <a:rPr sz="1100"/>
-                        <a:t>Software Licenses</a:t>
-                      </a:r>
-                    </a:p>
-                  </a:txBody>
-                  <a:tcPr>
-                    <a:solidFill>
-                      <a:srgbClr val="E7E6E6"/>
-                    </a:solidFill>
-                  </a:tcPr>
-                </a:tc>
-                <a:tc>
-                  <a:txBody>
-                    <a:bodyPr/>
-                    <a:lstStyle/>
-                    <a:p>
-                      <a:r>
-                        <a:rPr sz="1100"/>
-                        <a:t>$2,904</a:t>
-                      </a:r>
-                    </a:p>
-                  </a:txBody>
-                  <a:tcPr>
-                    <a:solidFill>
-                      <a:srgbClr val="E7E6E6"/>
-                    </a:solidFill>
-                  </a:tcPr>
-                </a:tc>
-                <a:tc>
-                  <a:txBody>
-                    <a:bodyPr/>
-                    <a:lstStyle/>
-                    <a:p>
-                      <a:r>
-                        <a:rPr sz="1100"/>
-                        <a:t>$0</a:t>
-                      </a:r>
-                    </a:p>
-                  </a:txBody>
-                  <a:tcPr>
-                    <a:solidFill>
-                      <a:srgbClr val="E7E6E6"/>
-                    </a:solidFill>
-                  </a:tcPr>
-                </a:tc>
-                <a:tc>
-                  <a:txBody>
-                    <a:bodyPr/>
-                    <a:lstStyle/>
-                    <a:p>
-                      <a:r>
-                        <a:rPr sz="1100"/>
-                        <a:t>$2,904</a:t>
-                      </a:r>
-                    </a:p>
-                  </a:txBody>
-                  <a:tcPr>
-                    <a:solidFill>
-                      <a:srgbClr val="E7E6E6"/>
-                    </a:solidFill>
-                  </a:tcPr>
-                </a:tc>
-                <a:tc>
-                  <a:txBody>
-                    <a:bodyPr/>
-                    <a:lstStyle/>
-                    <a:p>
-                      <a:r>
-                        <a:rPr sz="1100"/>
-                        <a:t>$2,904</a:t>
-                      </a:r>
-                    </a:p>
-                  </a:txBody>
-                  <a:tcPr>
-                    <a:solidFill>
-                      <a:srgbClr val="E7E6E6"/>
-                    </a:solidFill>
-                  </a:tcPr>
-                </a:tc>
-                <a:tc>
-                  <a:txBody>
-                    <a:bodyPr/>
-                    <a:lstStyle/>
-                    <a:p>
-                      <a:r>
-                        <a:rPr sz="1100"/>
-                        <a:t>$2,904</a:t>
-                      </a:r>
-                    </a:p>
-                  </a:txBody>
-                  <a:tcPr>
-                    <a:solidFill>
-                      <a:srgbClr val="E7E6E6"/>
-                    </a:solidFill>
-                  </a:tcPr>
-                </a:tc>
-                <a:tc>
-                  <a:txBody>
-                    <a:bodyPr/>
-                    <a:lstStyle/>
-                    <a:p>
-                      <a:r>
-                        <a:rPr sz="1100"/>
-                        <a:t>$8,712</a:t>
-                      </a:r>
-                    </a:p>
-                  </a:txBody>
-                  <a:tcPr>
-                    <a:solidFill>
-                      <a:srgbClr val="E7E6E6"/>
-                    </a:solidFill>
-                  </a:tcPr>
-                </a:tc>
-              </a:tr>
-              <a:tr h="370840">
-                <a:tc>
-                  <a:txBody>
-                    <a:bodyPr/>
-                    <a:lstStyle/>
-                    <a:p>
-                      <a:r>
-                        <a:rPr sz="1100"/>
-                        <a:t>Support &amp; Maintenance</a:t>
-                      </a:r>
-                    </a:p>
-                  </a:txBody>
-                  <a:tcPr>
-                    <a:solidFill>
-                      <a:srgbClr val="E7E6E6"/>
-                    </a:solidFill>
-                  </a:tcPr>
-                </a:tc>
-                <a:tc>
-                  <a:txBody>
-                    <a:bodyPr/>
-                    <a:lstStyle/>
-                    <a:p>
-                      <a:r>
-                        <a:rPr sz="1100"/>
-                        <a:t>$2,670</a:t>
-                      </a:r>
-                    </a:p>
-                  </a:txBody>
-                  <a:tcPr>
-                    <a:solidFill>
-                      <a:srgbClr val="E7E6E6"/>
-                    </a:solidFill>
-                  </a:tcPr>
-                </a:tc>
-                <a:tc>
-                  <a:txBody>
-                    <a:bodyPr/>
-                    <a:lstStyle/>
-                    <a:p>
-                      <a:r>
-                        <a:rPr sz="1100"/>
-                        <a:t>$0</a:t>
-                      </a:r>
-                    </a:p>
-                  </a:txBody>
-                  <a:tcPr>
-                    <a:solidFill>
-                      <a:srgbClr val="E7E6E6"/>
-                    </a:solidFill>
-                  </a:tcPr>
-                </a:tc>
-                <a:tc>
-                  <a:txBody>
-                    <a:bodyPr/>
-                    <a:lstStyle/>
-                    <a:p>
-                      <a:r>
-                        <a:rPr sz="1100"/>
-                        <a:t>$2,670</a:t>
-                      </a:r>
-                    </a:p>
-                  </a:txBody>
-                  <a:tcPr>
-                    <a:solidFill>
-                      <a:srgbClr val="E7E6E6"/>
-                    </a:solidFill>
-                  </a:tcPr>
-                </a:tc>
-                <a:tc>
-                  <a:txBody>
-                    <a:bodyPr/>
-                    <a:lstStyle/>
-                    <a:p>
-                      <a:r>
-                        <a:rPr sz="1100"/>
-                        <a:t>$2,670</a:t>
-                      </a:r>
-                    </a:p>
-                  </a:txBody>
-                  <a:tcPr>
-                    <a:solidFill>
-                      <a:srgbClr val="E7E6E6"/>
-                    </a:solidFill>
-                  </a:tcPr>
-                </a:tc>
-                <a:tc>
-                  <a:txBody>
-                    <a:bodyPr/>
-                    <a:lstStyle/>
-                    <a:p>
-                      <a:r>
-                        <a:rPr sz="1100"/>
-                        <a:t>$2,670</a:t>
-                      </a:r>
-                    </a:p>
-                  </a:txBody>
-                  <a:tcPr>
-                    <a:solidFill>
-                      <a:srgbClr val="E7E6E6"/>
-                    </a:solidFill>
-                  </a:tcPr>
-                </a:tc>
-                <a:tc>
-                  <a:txBody>
-                    <a:bodyPr/>
-                    <a:lstStyle/>
-                    <a:p>
-                      <a:r>
-                        <a:rPr sz="1100"/>
-                        <a:t>$8,010</a:t>
-                      </a:r>
-                    </a:p>
-                  </a:txBody>
-                  <a:tcPr>
-                    <a:solidFill>
-                      <a:srgbClr val="E7E6E6"/>
-                    </a:solidFill>
-                  </a:tcPr>
-                </a:tc>
-              </a:tr>
-              <a:tr h="370840">
-                <a:tc>
-                  <a:txBody>
-                    <a:bodyPr/>
-                    <a:lstStyle/>
-                    <a:p>
-                      <a:r>
-                        <a:rPr b="1" sz="1100"/>
-                        <a:t>TOTAL INVESTMENT</a:t>
-                      </a:r>
-                    </a:p>
-                  </a:txBody>
-                  <a:tcPr>
-                    <a:solidFill>
-                      <a:srgbClr val="E7E6E6"/>
-                    </a:solidFill>
-                  </a:tcPr>
-                </a:tc>
-                <a:tc>
-                  <a:txBody>
-                    <a:bodyPr/>
-                    <a:lstStyle/>
-                    <a:p>
-                      <a:r>
-                        <a:rPr b="1" sz="1100"/>
-                        <a:t>$106,352</a:t>
-                      </a:r>
-                    </a:p>
-                  </a:txBody>
-                  <a:tcPr>
-                    <a:solidFill>
-                      <a:srgbClr val="E7E6E6"/>
-                    </a:solidFill>
-                  </a:tcPr>
-                </a:tc>
-                <a:tc>
-                  <a:txBody>
-                    <a:bodyPr/>
-                    <a:lstStyle/>
-                    <a:p>
-                      <a:r>
-                        <a:rPr b="1" sz="1100"/>
-                        <a:t>($13,690)</a:t>
-                      </a:r>
-                    </a:p>
-                  </a:txBody>
-                  <a:tcPr>
-                    <a:solidFill>
-                      <a:srgbClr val="E7E6E6"/>
-                    </a:solidFill>
-                  </a:tcPr>
-                </a:tc>
-                <a:tc>
-                  <a:txBody>
-                    <a:bodyPr/>
-                    <a:lstStyle/>
-                    <a:p>
-                      <a:r>
-                        <a:rPr b="1" sz="1100"/>
-                        <a:t>$92,662</a:t>
-                      </a:r>
-                    </a:p>
-                  </a:txBody>
-                  <a:tcPr>
-                    <a:solidFill>
-                      <a:srgbClr val="E7E6E6"/>
-                    </a:solidFill>
-                  </a:tcPr>
-                </a:tc>
-                <a:tc>
-                  <a:txBody>
-                    <a:bodyPr/>
-                    <a:lstStyle/>
-                    <a:p>
-                      <a:r>
-                        <a:rPr b="1" sz="1100"/>
-                        <a:t>$24,102</a:t>
-                      </a:r>
-                    </a:p>
-                  </a:txBody>
-                  <a:tcPr>
-                    <a:solidFill>
-                      <a:srgbClr val="E7E6E6"/>
-                    </a:solidFill>
-                  </a:tcPr>
-                </a:tc>
-                <a:tc>
-                  <a:txBody>
-                    <a:bodyPr/>
-                    <a:lstStyle/>
-                    <a:p>
-                      <a:r>
-                        <a:rPr b="1" sz="1100"/>
-                        <a:t>$24,102</a:t>
-                      </a:r>
-                    </a:p>
-                  </a:txBody>
-                  <a:tcPr>
-                    <a:solidFill>
-                      <a:srgbClr val="E7E6E6"/>
-                    </a:solidFill>
-                  </a:tcPr>
-                </a:tc>
-                <a:tc>
-                  <a:txBody>
-                    <a:bodyPr/>
-                    <a:lstStyle/>
-                    <a:p>
-                      <a:r>
-                        <a:rPr b="1" sz="1100"/>
-                        <a:t>$140,866</a:t>
-                      </a:r>
-                    </a:p>
-                  </a:txBody>
-                  <a:tcPr>
-                    <a:solidFill>
-                      <a:srgbClr val="E7E6E6"/>
-                    </a:solidFill>
-                  </a:tcPr>
-                </a:tc>
-              </a:tr>
-            </a:tbl>
-          </a:graphicData>
-        </a:graphic>
-      </p:graphicFrame>
+        </p:nvSpPr>
+        <p:spPr/>
+        <p:txBody>
+          <a:bodyPr/>
+          <a:lstStyle/>
+          <a:p>
+            <a:pPr/>
+            <a:r>
+              <a:rPr b="1"/>
+              <a:t>What We Bring</a:t>
+            </a:r>
+          </a:p>
+          <a:p>
+            <a:pPr lvl="1"/>
+            <a:r>
+              <a:t>Microsoft Solutions Partner with AI and Data specialization</a:t>
+            </a:r>
+          </a:p>
+          <a:p>
+            <a:pPr lvl="1"/>
+            <a:r>
+              <a:t>50+ Azure Document Intelligence deployments across healthcare, finance, and insurance</a:t>
+            </a:r>
+          </a:p>
+          <a:p>
+            <a:pPr lvl="1"/>
+            <a:r>
+              <a:t>Certified Azure AI Engineers with custom model training expertise</a:t>
+            </a:r>
+          </a:p>
+          <a:p>
+            <a:pPr lvl="1"/>
+            <a:r>
+              <a:t>Pre-built accelerators for common document types and integrations</a:t>
+            </a:r>
+          </a:p>
+          <a:p>
+            <a:pPr lvl="1"/>
+            <a:r>
+              <a:t>Direct Microsoft escalation path for complex scenarios</a:t>
+            </a:r>
+          </a:p>
+        </p:txBody>
+      </p:sp>
+      <p:sp>
+        <p:nvSpPr>
+          <p:cNvPr id="5" name="Text Placeholder 4"/>
+          <p:cNvSpPr>
+            <a:spLocks noGrp="1"/>
+          </p:cNvSpPr>
+          <p:nvPr>
+            <p:ph type="body" idx="17" sz="quarter"/>
+          </p:nvPr>
+        </p:nvSpPr>
+        <p:spPr/>
+        <p:txBody>
+          <a:bodyPr/>
+          <a:lstStyle/>
+          <a:p>
+            <a:pPr/>
+            <a:r>
+              <a:rPr b="1"/>
+              <a:t>Value to You</a:t>
+            </a:r>
+          </a:p>
+          <a:p>
+            <a:pPr lvl="1"/>
+            <a:r>
+              <a:t>Proven deployment methodology reduces risk and accelerates time-to-value</a:t>
+            </a:r>
+          </a:p>
+          <a:p>
+            <a:pPr lvl="1"/>
+            <a:r>
+              <a:t>Pre-trained model templates for invoices, contracts, and forms</a:t>
+            </a:r>
+          </a:p>
+          <a:p>
+            <a:pPr lvl="1"/>
+            <a:r>
+              <a:t>Best practices from 50+ similar implementations</a:t>
+            </a:r>
+          </a:p>
+          <a:p>
+            <a:pPr lvl="1"/>
+            <a:r>
+              <a:t>Comprehensive knowledge transfer ensures team self-sufficiency</a:t>
+            </a:r>
+          </a:p>
+          <a:p>
+            <a:pPr lvl="1"/>
+            <a:r>
+              <a:t>Post-deployment optimization services improve accuracy over time</a:t>
+            </a:r>
+          </a:p>
+        </p:txBody>
+      </p:sp>
       <p:pic>
         <p:nvPicPr>
-          <p:cNvPr id="5" name="Picture 4" descr="eo-framework-logo-real.png"/>
+          <p:cNvPr id="6" name="Picture 5" descr="eo-framework-logo-real.png"/>
           <p:cNvPicPr>
             <a:picLocks noChangeAspect="1"/>
           </p:cNvPicPr>
@@ -5694,8 +6024,10 @@
           <a:bodyPr/>
           <a:lstStyle/>
           <a:p>
-            <a:r>
-              <a:t>Next Steps</a:t>
+            <a:pPr algn="l"/>
+            <a:r>
+              <a:rPr b="1"/>
+              <a:t>Investment Summary</a:t>
             </a:r>
           </a:p>
         </p:txBody>
@@ -5712,99 +6044,800 @@
         </p:nvPicPr>
         <p:blipFill>
           <a:blip r:embed="rId2"/>
-          <a:srcRect t="6762" b="6762"/>
+          <a:srcRect t="6404" b="6404"/>
           <a:stretch>
             <a:fillRect/>
           </a:stretch>
         </p:blipFill>
         <p:spPr/>
       </p:pic>
-      <p:sp>
-        <p:nvSpPr>
-          <p:cNvPr id="4" name="Text Placeholder 3"/>
-          <p:cNvSpPr>
-            <a:spLocks noGrp="1"/>
-          </p:cNvSpPr>
+      <p:graphicFrame>
+        <p:nvGraphicFramePr>
+          <p:cNvPr id="4" name="Table Placeholder 3"/>
+          <p:cNvGraphicFramePr>
+            <a:graphicFrameLocks noGrp="1"/>
+          </p:cNvGraphicFramePr>
           <p:nvPr>
-            <p:ph type="body" idx="14" sz="quarter"/>
+            <p:ph type="tbl" idx="14" sz="quarter"/>
           </p:nvPr>
-        </p:nvSpPr>
-        <p:spPr/>
-        <p:txBody>
-          <a:bodyPr/>
-          <a:lstStyle/>
-          <a:p>
-            <a:pPr/>
-            <a:r>
-              <a:rPr b="1"/>
-              <a:t>Decision:</a:t>
-            </a:r>
-            <a:r>
-              <a:t> Executive approval for pilot phase by [specific date]</a:t>
-            </a:r>
-          </a:p>
-          <a:p>
-            <a:pPr/>
-            <a:r>
-              <a:rPr b="1"/>
-              <a:t>Kickoff:</a:t>
-            </a:r>
-            <a:r>
-              <a:t> Target pilot start date [30 days from approval]</a:t>
-            </a:r>
-          </a:p>
-          <a:p>
-            <a:pPr/>
-            <a:r>
-              <a:rPr b="1"/>
-              <a:t>Team Formation:</a:t>
-            </a:r>
-            <a:r>
-              <a:t> Identify business SME, IT contact, document samples</a:t>
-            </a:r>
-          </a:p>
-          <a:p>
-            <a:pPr/>
-            <a:r>
-              <a:rPr b="1"/>
-              <a:t>Week 1:</a:t>
-            </a:r>
-            <a:r>
-              <a:t> Contract finalization and Azure account setup</a:t>
-            </a:r>
-          </a:p>
-          <a:p>
-            <a:pPr/>
-            <a:r>
-              <a:rPr b="1"/>
-              <a:t>Week 2:</a:t>
-            </a:r>
-            <a:r>
-              <a:t> Document sample collection and AI model configuration</a:t>
-            </a:r>
-          </a:p>
-          <a:p>
-            <a:pPr/>
-            <a:r>
-              <a:rPr b="1"/>
-              <a:t>Week 3:</a:t>
-            </a:r>
-            <a:r>
-              <a:t> Document Intelligence/Text Analytics training and initial testing</a:t>
-            </a:r>
-          </a:p>
-          <a:p>
-            <a:pPr/>
-            <a:r>
-              <a:rPr b="1"/>
-              <a:t>Week 4:</a:t>
-            </a:r>
-            <a:r>
-              <a:t> First production documents processed with validation</a:t>
-            </a:r>
-          </a:p>
-        </p:txBody>
-      </p:sp>
+        </p:nvGraphicFramePr>
+        <p:xfrm>
+          <a:off x="256855" y="677011"/>
+          <a:ext cx="8710929" cy="2225040"/>
+        </p:xfrm>
+        <a:graphic>
+          <a:graphicData uri="http://schemas.openxmlformats.org/drawingml/2006/table">
+            <a:tbl>
+              <a:tblPr firstRow="1" bandRow="1">
+                <a:tableStyleId>{5C22544A-7EE6-4342-B048-85BDC9FD1C3A}</a:tableStyleId>
+              </a:tblPr>
+              <a:tblGrid>
+                <a:gridCol w="1742186"/>
+                <a:gridCol w="1045311"/>
+                <a:gridCol w="2003514"/>
+                <a:gridCol w="1132421"/>
+                <a:gridCol w="871093"/>
+                <a:gridCol w="871093"/>
+                <a:gridCol w="1045311"/>
+              </a:tblGrid>
+              <a:tr h="370840">
+                <a:tc>
+                  <a:txBody>
+                    <a:bodyPr/>
+                    <a:lstStyle/>
+                    <a:p>
+                      <a:r>
+                        <a:rPr sz="1400">
+                          <a:solidFill>
+                            <a:srgbClr val="FFFFFF"/>
+                          </a:solidFill>
+                        </a:rPr>
+                        <a:t>Cost Category</a:t>
+                      </a:r>
+                    </a:p>
+                  </a:txBody>
+                  <a:tcPr>
+                    <a:solidFill>
+                      <a:srgbClr val="A01C02"/>
+                    </a:solidFill>
+                  </a:tcPr>
+                </a:tc>
+                <a:tc>
+                  <a:txBody>
+                    <a:bodyPr/>
+                    <a:lstStyle/>
+                    <a:p>
+                      <a:r>
+                        <a:rPr sz="1400">
+                          <a:solidFill>
+                            <a:srgbClr val="FFFFFF"/>
+                          </a:solidFill>
+                        </a:rPr>
+                        <a:t>Year 1 List</a:t>
+                      </a:r>
+                    </a:p>
+                  </a:txBody>
+                  <a:tcPr>
+                    <a:solidFill>
+                      <a:srgbClr val="A01C02"/>
+                    </a:solidFill>
+                  </a:tcPr>
+                </a:tc>
+                <a:tc>
+                  <a:txBody>
+                    <a:bodyPr/>
+                    <a:lstStyle/>
+                    <a:p>
+                      <a:r>
+                        <a:rPr sz="1400">
+                          <a:solidFill>
+                            <a:srgbClr val="FFFFFF"/>
+                          </a:solidFill>
+                        </a:rPr>
+                        <a:t>Provider/Partner Credits</a:t>
+                      </a:r>
+                    </a:p>
+                  </a:txBody>
+                  <a:tcPr>
+                    <a:solidFill>
+                      <a:srgbClr val="A01C02"/>
+                    </a:solidFill>
+                  </a:tcPr>
+                </a:tc>
+                <a:tc>
+                  <a:txBody>
+                    <a:bodyPr/>
+                    <a:lstStyle/>
+                    <a:p>
+                      <a:r>
+                        <a:rPr sz="1400">
+                          <a:solidFill>
+                            <a:srgbClr val="FFFFFF"/>
+                          </a:solidFill>
+                        </a:rPr>
+                        <a:t>Year 1 Net</a:t>
+                      </a:r>
+                    </a:p>
+                  </a:txBody>
+                  <a:tcPr>
+                    <a:solidFill>
+                      <a:srgbClr val="A01C02"/>
+                    </a:solidFill>
+                  </a:tcPr>
+                </a:tc>
+                <a:tc>
+                  <a:txBody>
+                    <a:bodyPr/>
+                    <a:lstStyle/>
+                    <a:p>
+                      <a:r>
+                        <a:rPr sz="1400">
+                          <a:solidFill>
+                            <a:srgbClr val="FFFFFF"/>
+                          </a:solidFill>
+                        </a:rPr>
+                        <a:t>Year 2</a:t>
+                      </a:r>
+                    </a:p>
+                  </a:txBody>
+                  <a:tcPr>
+                    <a:solidFill>
+                      <a:srgbClr val="A01C02"/>
+                    </a:solidFill>
+                  </a:tcPr>
+                </a:tc>
+                <a:tc>
+                  <a:txBody>
+                    <a:bodyPr/>
+                    <a:lstStyle/>
+                    <a:p>
+                      <a:r>
+                        <a:rPr sz="1400">
+                          <a:solidFill>
+                            <a:srgbClr val="FFFFFF"/>
+                          </a:solidFill>
+                        </a:rPr>
+                        <a:t>Year 3</a:t>
+                      </a:r>
+                    </a:p>
+                  </a:txBody>
+                  <a:tcPr>
+                    <a:solidFill>
+                      <a:srgbClr val="A01C02"/>
+                    </a:solidFill>
+                  </a:tcPr>
+                </a:tc>
+                <a:tc>
+                  <a:txBody>
+                    <a:bodyPr/>
+                    <a:lstStyle/>
+                    <a:p>
+                      <a:r>
+                        <a:rPr sz="1400">
+                          <a:solidFill>
+                            <a:srgbClr val="FFFFFF"/>
+                          </a:solidFill>
+                        </a:rPr>
+                        <a:t>3-Year Total</a:t>
+                      </a:r>
+                    </a:p>
+                  </a:txBody>
+                  <a:tcPr>
+                    <a:solidFill>
+                      <a:srgbClr val="A01C02"/>
+                    </a:solidFill>
+                  </a:tcPr>
+                </a:tc>
+              </a:tr>
+              <a:tr h="370840">
+                <a:tc>
+                  <a:txBody>
+                    <a:bodyPr/>
+                    <a:lstStyle/>
+                    <a:p>
+                      <a:r>
+                        <a:rPr sz="1100"/>
+                        <a:t>Cloud Infrastructure</a:t>
+                      </a:r>
+                    </a:p>
+                  </a:txBody>
+                  <a:tcPr>
+                    <a:solidFill>
+                      <a:srgbClr val="E7E6E6"/>
+                    </a:solidFill>
+                  </a:tcPr>
+                </a:tc>
+                <a:tc>
+                  <a:txBody>
+                    <a:bodyPr/>
+                    <a:lstStyle/>
+                    <a:p>
+                      <a:r>
+                        <a:rPr sz="1100"/>
+                        <a:t>$14,400</a:t>
+                      </a:r>
+                    </a:p>
+                  </a:txBody>
+                  <a:tcPr>
+                    <a:solidFill>
+                      <a:srgbClr val="E7E6E6"/>
+                    </a:solidFill>
+                  </a:tcPr>
+                </a:tc>
+                <a:tc>
+                  <a:txBody>
+                    <a:bodyPr/>
+                    <a:lstStyle/>
+                    <a:p>
+                      <a:r>
+                        <a:rPr sz="1100"/>
+                        <a:t>($5,000)</a:t>
+                      </a:r>
+                    </a:p>
+                  </a:txBody>
+                  <a:tcPr>
+                    <a:solidFill>
+                      <a:srgbClr val="E7E6E6"/>
+                    </a:solidFill>
+                  </a:tcPr>
+                </a:tc>
+                <a:tc>
+                  <a:txBody>
+                    <a:bodyPr/>
+                    <a:lstStyle/>
+                    <a:p>
+                      <a:r>
+                        <a:rPr sz="1100"/>
+                        <a:t>$9,400</a:t>
+                      </a:r>
+                    </a:p>
+                  </a:txBody>
+                  <a:tcPr>
+                    <a:solidFill>
+                      <a:srgbClr val="E7E6E6"/>
+                    </a:solidFill>
+                  </a:tcPr>
+                </a:tc>
+                <a:tc>
+                  <a:txBody>
+                    <a:bodyPr/>
+                    <a:lstStyle/>
+                    <a:p>
+                      <a:r>
+                        <a:rPr sz="1100"/>
+                        <a:t>$14,400</a:t>
+                      </a:r>
+                    </a:p>
+                  </a:txBody>
+                  <a:tcPr>
+                    <a:solidFill>
+                      <a:srgbClr val="E7E6E6"/>
+                    </a:solidFill>
+                  </a:tcPr>
+                </a:tc>
+                <a:tc>
+                  <a:txBody>
+                    <a:bodyPr/>
+                    <a:lstStyle/>
+                    <a:p>
+                      <a:r>
+                        <a:rPr sz="1100"/>
+                        <a:t>$14,400</a:t>
+                      </a:r>
+                    </a:p>
+                  </a:txBody>
+                  <a:tcPr>
+                    <a:solidFill>
+                      <a:srgbClr val="E7E6E6"/>
+                    </a:solidFill>
+                  </a:tcPr>
+                </a:tc>
+                <a:tc>
+                  <a:txBody>
+                    <a:bodyPr/>
+                    <a:lstStyle/>
+                    <a:p>
+                      <a:r>
+                        <a:rPr sz="1100"/>
+                        <a:t>$38,200</a:t>
+                      </a:r>
+                    </a:p>
+                  </a:txBody>
+                  <a:tcPr>
+                    <a:solidFill>
+                      <a:srgbClr val="E7E6E6"/>
+                    </a:solidFill>
+                  </a:tcPr>
+                </a:tc>
+              </a:tr>
+              <a:tr h="370840">
+                <a:tc>
+                  <a:txBody>
+                    <a:bodyPr/>
+                    <a:lstStyle/>
+                    <a:p>
+                      <a:r>
+                        <a:rPr sz="1100"/>
+                        <a:t>Professional Services</a:t>
+                      </a:r>
+                    </a:p>
+                  </a:txBody>
+                  <a:tcPr>
+                    <a:solidFill>
+                      <a:srgbClr val="E7E6E6"/>
+                    </a:solidFill>
+                  </a:tcPr>
+                </a:tc>
+                <a:tc>
+                  <a:txBody>
+                    <a:bodyPr/>
+                    <a:lstStyle/>
+                    <a:p>
+                      <a:r>
+                        <a:rPr sz="1100"/>
+                        <a:t>$72,000</a:t>
+                      </a:r>
+                    </a:p>
+                  </a:txBody>
+                  <a:tcPr>
+                    <a:solidFill>
+                      <a:srgbClr val="E7E6E6"/>
+                    </a:solidFill>
+                  </a:tcPr>
+                </a:tc>
+                <a:tc>
+                  <a:txBody>
+                    <a:bodyPr/>
+                    <a:lstStyle/>
+                    <a:p>
+                      <a:r>
+                        <a:rPr sz="1100"/>
+                        <a:t>$0</a:t>
+                      </a:r>
+                    </a:p>
+                  </a:txBody>
+                  <a:tcPr>
+                    <a:solidFill>
+                      <a:srgbClr val="E7E6E6"/>
+                    </a:solidFill>
+                  </a:tcPr>
+                </a:tc>
+                <a:tc>
+                  <a:txBody>
+                    <a:bodyPr/>
+                    <a:lstStyle/>
+                    <a:p>
+                      <a:r>
+                        <a:rPr sz="1100"/>
+                        <a:t>$72,000</a:t>
+                      </a:r>
+                    </a:p>
+                  </a:txBody>
+                  <a:tcPr>
+                    <a:solidFill>
+                      <a:srgbClr val="E7E6E6"/>
+                    </a:solidFill>
+                  </a:tcPr>
+                </a:tc>
+                <a:tc>
+                  <a:txBody>
+                    <a:bodyPr/>
+                    <a:lstStyle/>
+                    <a:p>
+                      <a:r>
+                        <a:rPr sz="1100"/>
+                        <a:t>$0</a:t>
+                      </a:r>
+                    </a:p>
+                  </a:txBody>
+                  <a:tcPr>
+                    <a:solidFill>
+                      <a:srgbClr val="E7E6E6"/>
+                    </a:solidFill>
+                  </a:tcPr>
+                </a:tc>
+                <a:tc>
+                  <a:txBody>
+                    <a:bodyPr/>
+                    <a:lstStyle/>
+                    <a:p>
+                      <a:r>
+                        <a:rPr sz="1100"/>
+                        <a:t>$0</a:t>
+                      </a:r>
+                    </a:p>
+                  </a:txBody>
+                  <a:tcPr>
+                    <a:solidFill>
+                      <a:srgbClr val="E7E6E6"/>
+                    </a:solidFill>
+                  </a:tcPr>
+                </a:tc>
+                <a:tc>
+                  <a:txBody>
+                    <a:bodyPr/>
+                    <a:lstStyle/>
+                    <a:p>
+                      <a:r>
+                        <a:rPr sz="1100"/>
+                        <a:t>$72,000</a:t>
+                      </a:r>
+                    </a:p>
+                  </a:txBody>
+                  <a:tcPr>
+                    <a:solidFill>
+                      <a:srgbClr val="E7E6E6"/>
+                    </a:solidFill>
+                  </a:tcPr>
+                </a:tc>
+              </a:tr>
+              <a:tr h="370840">
+                <a:tc>
+                  <a:txBody>
+                    <a:bodyPr/>
+                    <a:lstStyle/>
+                    <a:p>
+                      <a:r>
+                        <a:rPr sz="1100"/>
+                        <a:t>Software Licenses &amp; Subscriptions</a:t>
+                      </a:r>
+                    </a:p>
+                  </a:txBody>
+                  <a:tcPr>
+                    <a:solidFill>
+                      <a:srgbClr val="E7E6E6"/>
+                    </a:solidFill>
+                  </a:tcPr>
+                </a:tc>
+                <a:tc>
+                  <a:txBody>
+                    <a:bodyPr/>
+                    <a:lstStyle/>
+                    <a:p>
+                      <a:r>
+                        <a:rPr sz="1100"/>
+                        <a:t>$960</a:t>
+                      </a:r>
+                    </a:p>
+                  </a:txBody>
+                  <a:tcPr>
+                    <a:solidFill>
+                      <a:srgbClr val="E7E6E6"/>
+                    </a:solidFill>
+                  </a:tcPr>
+                </a:tc>
+                <a:tc>
+                  <a:txBody>
+                    <a:bodyPr/>
+                    <a:lstStyle/>
+                    <a:p>
+                      <a:r>
+                        <a:rPr sz="1100"/>
+                        <a:t>$0</a:t>
+                      </a:r>
+                    </a:p>
+                  </a:txBody>
+                  <a:tcPr>
+                    <a:solidFill>
+                      <a:srgbClr val="E7E6E6"/>
+                    </a:solidFill>
+                  </a:tcPr>
+                </a:tc>
+                <a:tc>
+                  <a:txBody>
+                    <a:bodyPr/>
+                    <a:lstStyle/>
+                    <a:p>
+                      <a:r>
+                        <a:rPr sz="1100"/>
+                        <a:t>$960</a:t>
+                      </a:r>
+                    </a:p>
+                  </a:txBody>
+                  <a:tcPr>
+                    <a:solidFill>
+                      <a:srgbClr val="E7E6E6"/>
+                    </a:solidFill>
+                  </a:tcPr>
+                </a:tc>
+                <a:tc>
+                  <a:txBody>
+                    <a:bodyPr/>
+                    <a:lstStyle/>
+                    <a:p>
+                      <a:r>
+                        <a:rPr sz="1100"/>
+                        <a:t>$960</a:t>
+                      </a:r>
+                    </a:p>
+                  </a:txBody>
+                  <a:tcPr>
+                    <a:solidFill>
+                      <a:srgbClr val="E7E6E6"/>
+                    </a:solidFill>
+                  </a:tcPr>
+                </a:tc>
+                <a:tc>
+                  <a:txBody>
+                    <a:bodyPr/>
+                    <a:lstStyle/>
+                    <a:p>
+                      <a:r>
+                        <a:rPr sz="1100"/>
+                        <a:t>$960</a:t>
+                      </a:r>
+                    </a:p>
+                  </a:txBody>
+                  <a:tcPr>
+                    <a:solidFill>
+                      <a:srgbClr val="E7E6E6"/>
+                    </a:solidFill>
+                  </a:tcPr>
+                </a:tc>
+                <a:tc>
+                  <a:txBody>
+                    <a:bodyPr/>
+                    <a:lstStyle/>
+                    <a:p>
+                      <a:r>
+                        <a:rPr sz="1100"/>
+                        <a:t>$2,880</a:t>
+                      </a:r>
+                    </a:p>
+                  </a:txBody>
+                  <a:tcPr>
+                    <a:solidFill>
+                      <a:srgbClr val="E7E6E6"/>
+                    </a:solidFill>
+                  </a:tcPr>
+                </a:tc>
+              </a:tr>
+              <a:tr h="370840">
+                <a:tc>
+                  <a:txBody>
+                    <a:bodyPr/>
+                    <a:lstStyle/>
+                    <a:p>
+                      <a:r>
+                        <a:rPr sz="1100"/>
+                        <a:t>Support &amp; Maintenance</a:t>
+                      </a:r>
+                    </a:p>
+                  </a:txBody>
+                  <a:tcPr>
+                    <a:solidFill>
+                      <a:srgbClr val="E7E6E6"/>
+                    </a:solidFill>
+                  </a:tcPr>
+                </a:tc>
+                <a:tc>
+                  <a:txBody>
+                    <a:bodyPr/>
+                    <a:lstStyle/>
+                    <a:p>
+                      <a:r>
+                        <a:rPr sz="1100"/>
+                        <a:t>$1,200</a:t>
+                      </a:r>
+                    </a:p>
+                  </a:txBody>
+                  <a:tcPr>
+                    <a:solidFill>
+                      <a:srgbClr val="E7E6E6"/>
+                    </a:solidFill>
+                  </a:tcPr>
+                </a:tc>
+                <a:tc>
+                  <a:txBody>
+                    <a:bodyPr/>
+                    <a:lstStyle/>
+                    <a:p>
+                      <a:r>
+                        <a:rPr sz="1100"/>
+                        <a:t>$0</a:t>
+                      </a:r>
+                    </a:p>
+                  </a:txBody>
+                  <a:tcPr>
+                    <a:solidFill>
+                      <a:srgbClr val="E7E6E6"/>
+                    </a:solidFill>
+                  </a:tcPr>
+                </a:tc>
+                <a:tc>
+                  <a:txBody>
+                    <a:bodyPr/>
+                    <a:lstStyle/>
+                    <a:p>
+                      <a:r>
+                        <a:rPr sz="1100"/>
+                        <a:t>$1,200</a:t>
+                      </a:r>
+                    </a:p>
+                  </a:txBody>
+                  <a:tcPr>
+                    <a:solidFill>
+                      <a:srgbClr val="E7E6E6"/>
+                    </a:solidFill>
+                  </a:tcPr>
+                </a:tc>
+                <a:tc>
+                  <a:txBody>
+                    <a:bodyPr/>
+                    <a:lstStyle/>
+                    <a:p>
+                      <a:r>
+                        <a:rPr sz="1100"/>
+                        <a:t>$1,200</a:t>
+                      </a:r>
+                    </a:p>
+                  </a:txBody>
+                  <a:tcPr>
+                    <a:solidFill>
+                      <a:srgbClr val="E7E6E6"/>
+                    </a:solidFill>
+                  </a:tcPr>
+                </a:tc>
+                <a:tc>
+                  <a:txBody>
+                    <a:bodyPr/>
+                    <a:lstStyle/>
+                    <a:p>
+                      <a:r>
+                        <a:rPr sz="1100"/>
+                        <a:t>$1,200</a:t>
+                      </a:r>
+                    </a:p>
+                  </a:txBody>
+                  <a:tcPr>
+                    <a:solidFill>
+                      <a:srgbClr val="E7E6E6"/>
+                    </a:solidFill>
+                  </a:tcPr>
+                </a:tc>
+                <a:tc>
+                  <a:txBody>
+                    <a:bodyPr/>
+                    <a:lstStyle/>
+                    <a:p>
+                      <a:r>
+                        <a:rPr sz="1100"/>
+                        <a:t>$3,600</a:t>
+                      </a:r>
+                    </a:p>
+                  </a:txBody>
+                  <a:tcPr>
+                    <a:solidFill>
+                      <a:srgbClr val="E7E6E6"/>
+                    </a:solidFill>
+                  </a:tcPr>
+                </a:tc>
+              </a:tr>
+              <a:tr h="370840">
+                <a:tc>
+                  <a:txBody>
+                    <a:bodyPr/>
+                    <a:lstStyle/>
+                    <a:p>
+                      <a:r>
+                        <a:rPr b="1" sz="1100"/>
+                        <a:t>TOTAL INVESTMENT</a:t>
+                      </a:r>
+                    </a:p>
+                  </a:txBody>
+                  <a:tcPr>
+                    <a:solidFill>
+                      <a:srgbClr val="E7E6E6"/>
+                    </a:solidFill>
+                  </a:tcPr>
+                </a:tc>
+                <a:tc>
+                  <a:txBody>
+                    <a:bodyPr/>
+                    <a:lstStyle/>
+                    <a:p>
+                      <a:r>
+                        <a:rPr b="1" sz="1100"/>
+                        <a:t>$88,560</a:t>
+                      </a:r>
+                    </a:p>
+                  </a:txBody>
+                  <a:tcPr>
+                    <a:solidFill>
+                      <a:srgbClr val="E7E6E6"/>
+                    </a:solidFill>
+                  </a:tcPr>
+                </a:tc>
+                <a:tc>
+                  <a:txBody>
+                    <a:bodyPr/>
+                    <a:lstStyle/>
+                    <a:p>
+                      <a:r>
+                        <a:rPr b="1" sz="1100"/>
+                        <a:t>($5,000)</a:t>
+                      </a:r>
+                    </a:p>
+                  </a:txBody>
+                  <a:tcPr>
+                    <a:solidFill>
+                      <a:srgbClr val="E7E6E6"/>
+                    </a:solidFill>
+                  </a:tcPr>
+                </a:tc>
+                <a:tc>
+                  <a:txBody>
+                    <a:bodyPr/>
+                    <a:lstStyle/>
+                    <a:p>
+                      <a:r>
+                        <a:rPr b="1" sz="1100"/>
+                        <a:t>$83,560</a:t>
+                      </a:r>
+                    </a:p>
+                  </a:txBody>
+                  <a:tcPr>
+                    <a:solidFill>
+                      <a:srgbClr val="E7E6E6"/>
+                    </a:solidFill>
+                  </a:tcPr>
+                </a:tc>
+                <a:tc>
+                  <a:txBody>
+                    <a:bodyPr/>
+                    <a:lstStyle/>
+                    <a:p>
+                      <a:r>
+                        <a:rPr b="1" sz="1100"/>
+                        <a:t>$16,560</a:t>
+                      </a:r>
+                    </a:p>
+                  </a:txBody>
+                  <a:tcPr>
+                    <a:solidFill>
+                      <a:srgbClr val="E7E6E6"/>
+                    </a:solidFill>
+                  </a:tcPr>
+                </a:tc>
+                <a:tc>
+                  <a:txBody>
+                    <a:bodyPr/>
+                    <a:lstStyle/>
+                    <a:p>
+                      <a:r>
+                        <a:rPr b="1" sz="1100"/>
+                        <a:t>$16,560</a:t>
+                      </a:r>
+                    </a:p>
+                  </a:txBody>
+                  <a:tcPr>
+                    <a:solidFill>
+                      <a:srgbClr val="E7E6E6"/>
+                    </a:solidFill>
+                  </a:tcPr>
+                </a:tc>
+                <a:tc>
+                  <a:txBody>
+                    <a:bodyPr/>
+                    <a:lstStyle/>
+                    <a:p>
+                      <a:r>
+                        <a:rPr b="1" sz="1100"/>
+                        <a:t>$116,680</a:t>
+                      </a:r>
+                    </a:p>
+                  </a:txBody>
+                  <a:tcPr>
+                    <a:solidFill>
+                      <a:srgbClr val="E7E6E6"/>
+                    </a:solidFill>
+                  </a:tcPr>
+                </a:tc>
+              </a:tr>
+            </a:tbl>
+          </a:graphicData>
+        </a:graphic>
+      </p:graphicFrame>
       <p:pic>
         <p:nvPicPr>
           <p:cNvPr id="5" name="Picture 4" descr="eo-framework-logo-real.png"/>

</xml_diff>

<commit_message>
Improve SOW content structure and formatting
Changes to solution-template and AWS/Azure solutions:
- Consolidated objectives by removing duplication from Executive Summary
- Enhanced Business Objectives with hybrid approach combining business value and technical specifics
- Applied bold formatting to Current State and Business Objectives labels for visual consistency
- Fixed metadata formatting by removing unnecessary single quotes from YAML placeholders
- Removed internal CSV file references from client-facing SOWs

Affected solutions:
- solution-template (sample solution)
- AWS: intelligent-document-processing, disaster-recovery-web-application, onpremise-to-cloud-migration
- Azure: document-intelligence (includes migration to EO Framework compliance with infrastructure-costs.csv rename)
</commit_message>
<xml_diff>
--- a/solutions/azure/ai/document-intelligence/presales/solution-briefing.pptx
+++ b/solutions/azure/ai/document-intelligence/presales/solution-briefing.pptx
@@ -3361,7 +3361,7 @@
           <a:lstStyle/>
           <a:p>
             <a:r>
-              <a:t>[Presenter Name] | November 17, 2025</a:t>
+              <a:t>[Presenter Name] | November 18, 2025</a:t>
             </a:r>
           </a:p>
         </p:txBody>
@@ -5951,7 +5951,7 @@
         </p:nvGraphicFramePr>
         <p:xfrm>
           <a:off x="256855" y="677011"/>
-          <a:ext cx="8710929" cy="741680"/>
+          <a:ext cx="8710928" cy="2225040"/>
         </p:xfrm>
         <a:graphic>
           <a:graphicData uri="http://schemas.openxmlformats.org/drawingml/2006/table">
@@ -5960,13 +5960,13 @@
                 <a:tableStyleId>{5C22544A-7EE6-4342-B048-85BDC9FD1C3A}</a:tableStyleId>
               </a:tblPr>
               <a:tblGrid>
-                <a:gridCol w="2177733"/>
-                <a:gridCol w="1306639"/>
-                <a:gridCol w="1306639"/>
-                <a:gridCol w="1306639"/>
+                <a:gridCol w="1567967"/>
+                <a:gridCol w="1045311"/>
+                <a:gridCol w="2090623"/>
+                <a:gridCol w="1045311"/>
                 <a:gridCol w="871093"/>
                 <a:gridCol w="871093"/>
-                <a:gridCol w="871093"/>
+                <a:gridCol w="1219530"/>
               </a:tblGrid>
               <a:tr h="370840">
                 <a:tc>
@@ -6124,6 +6124,490 @@
                     <a:lstStyle/>
                     <a:p>
                       <a:r>
+                        <a:rPr sz="1100"/>
+                        <a:t>Professional Services</a:t>
+                      </a:r>
+                    </a:p>
+                  </a:txBody>
+                  <a:tcPr>
+                    <a:solidFill>
+                      <a:srgbClr val="E7E6E6"/>
+                    </a:solidFill>
+                  </a:tcPr>
+                </a:tc>
+                <a:tc>
+                  <a:txBody>
+                    <a:bodyPr/>
+                    <a:lstStyle/>
+                    <a:p>
+                      <a:r>
+                        <a:rPr sz="1100"/>
+                        <a:t>$82,250</a:t>
+                      </a:r>
+                    </a:p>
+                  </a:txBody>
+                  <a:tcPr>
+                    <a:solidFill>
+                      <a:srgbClr val="E7E6E6"/>
+                    </a:solidFill>
+                  </a:tcPr>
+                </a:tc>
+                <a:tc>
+                  <a:txBody>
+                    <a:bodyPr/>
+                    <a:lstStyle/>
+                    <a:p>
+                      <a:r>
+                        <a:rPr sz="1100"/>
+                        <a:t>($10,000)</a:t>
+                      </a:r>
+                    </a:p>
+                  </a:txBody>
+                  <a:tcPr>
+                    <a:solidFill>
+                      <a:srgbClr val="E7E6E6"/>
+                    </a:solidFill>
+                  </a:tcPr>
+                </a:tc>
+                <a:tc>
+                  <a:txBody>
+                    <a:bodyPr/>
+                    <a:lstStyle/>
+                    <a:p>
+                      <a:r>
+                        <a:rPr sz="1100"/>
+                        <a:t>$72,250</a:t>
+                      </a:r>
+                    </a:p>
+                  </a:txBody>
+                  <a:tcPr>
+                    <a:solidFill>
+                      <a:srgbClr val="E7E6E6"/>
+                    </a:solidFill>
+                  </a:tcPr>
+                </a:tc>
+                <a:tc>
+                  <a:txBody>
+                    <a:bodyPr/>
+                    <a:lstStyle/>
+                    <a:p>
+                      <a:r>
+                        <a:rPr sz="1100"/>
+                        <a:t>$0</a:t>
+                      </a:r>
+                    </a:p>
+                  </a:txBody>
+                  <a:tcPr>
+                    <a:solidFill>
+                      <a:srgbClr val="E7E6E6"/>
+                    </a:solidFill>
+                  </a:tcPr>
+                </a:tc>
+                <a:tc>
+                  <a:txBody>
+                    <a:bodyPr/>
+                    <a:lstStyle/>
+                    <a:p>
+                      <a:r>
+                        <a:rPr sz="1100"/>
+                        <a:t>$0</a:t>
+                      </a:r>
+                    </a:p>
+                  </a:txBody>
+                  <a:tcPr>
+                    <a:solidFill>
+                      <a:srgbClr val="E7E6E6"/>
+                    </a:solidFill>
+                  </a:tcPr>
+                </a:tc>
+                <a:tc>
+                  <a:txBody>
+                    <a:bodyPr/>
+                    <a:lstStyle/>
+                    <a:p>
+                      <a:r>
+                        <a:rPr sz="1100"/>
+                        <a:t>$72,250</a:t>
+                      </a:r>
+                    </a:p>
+                  </a:txBody>
+                  <a:tcPr>
+                    <a:solidFill>
+                      <a:srgbClr val="E7E6E6"/>
+                    </a:solidFill>
+                  </a:tcPr>
+                </a:tc>
+              </a:tr>
+              <a:tr h="370840">
+                <a:tc>
+                  <a:txBody>
+                    <a:bodyPr/>
+                    <a:lstStyle/>
+                    <a:p>
+                      <a:r>
+                        <a:rPr sz="1100"/>
+                        <a:t>Cloud Infrastructure</a:t>
+                      </a:r>
+                    </a:p>
+                  </a:txBody>
+                  <a:tcPr>
+                    <a:solidFill>
+                      <a:srgbClr val="E7E6E6"/>
+                    </a:solidFill>
+                  </a:tcPr>
+                </a:tc>
+                <a:tc>
+                  <a:txBody>
+                    <a:bodyPr/>
+                    <a:lstStyle/>
+                    <a:p>
+                      <a:r>
+                        <a:rPr sz="1100"/>
+                        <a:t>$18,528</a:t>
+                      </a:r>
+                    </a:p>
+                  </a:txBody>
+                  <a:tcPr>
+                    <a:solidFill>
+                      <a:srgbClr val="E7E6E6"/>
+                    </a:solidFill>
+                  </a:tcPr>
+                </a:tc>
+                <a:tc>
+                  <a:txBody>
+                    <a:bodyPr/>
+                    <a:lstStyle/>
+                    <a:p>
+                      <a:r>
+                        <a:rPr sz="1100"/>
+                        <a:t>($3,690)</a:t>
+                      </a:r>
+                    </a:p>
+                  </a:txBody>
+                  <a:tcPr>
+                    <a:solidFill>
+                      <a:srgbClr val="E7E6E6"/>
+                    </a:solidFill>
+                  </a:tcPr>
+                </a:tc>
+                <a:tc>
+                  <a:txBody>
+                    <a:bodyPr/>
+                    <a:lstStyle/>
+                    <a:p>
+                      <a:r>
+                        <a:rPr sz="1100"/>
+                        <a:t>$14,838</a:t>
+                      </a:r>
+                    </a:p>
+                  </a:txBody>
+                  <a:tcPr>
+                    <a:solidFill>
+                      <a:srgbClr val="E7E6E6"/>
+                    </a:solidFill>
+                  </a:tcPr>
+                </a:tc>
+                <a:tc>
+                  <a:txBody>
+                    <a:bodyPr/>
+                    <a:lstStyle/>
+                    <a:p>
+                      <a:r>
+                        <a:rPr sz="1100"/>
+                        <a:t>$18,528</a:t>
+                      </a:r>
+                    </a:p>
+                  </a:txBody>
+                  <a:tcPr>
+                    <a:solidFill>
+                      <a:srgbClr val="E7E6E6"/>
+                    </a:solidFill>
+                  </a:tcPr>
+                </a:tc>
+                <a:tc>
+                  <a:txBody>
+                    <a:bodyPr/>
+                    <a:lstStyle/>
+                    <a:p>
+                      <a:r>
+                        <a:rPr sz="1100"/>
+                        <a:t>$18,528</a:t>
+                      </a:r>
+                    </a:p>
+                  </a:txBody>
+                  <a:tcPr>
+                    <a:solidFill>
+                      <a:srgbClr val="E7E6E6"/>
+                    </a:solidFill>
+                  </a:tcPr>
+                </a:tc>
+                <a:tc>
+                  <a:txBody>
+                    <a:bodyPr/>
+                    <a:lstStyle/>
+                    <a:p>
+                      <a:r>
+                        <a:rPr sz="1100"/>
+                        <a:t>$51,894</a:t>
+                      </a:r>
+                    </a:p>
+                  </a:txBody>
+                  <a:tcPr>
+                    <a:solidFill>
+                      <a:srgbClr val="E7E6E6"/>
+                    </a:solidFill>
+                  </a:tcPr>
+                </a:tc>
+              </a:tr>
+              <a:tr h="370840">
+                <a:tc>
+                  <a:txBody>
+                    <a:bodyPr/>
+                    <a:lstStyle/>
+                    <a:p>
+                      <a:r>
+                        <a:rPr sz="1100"/>
+                        <a:t>Software Licenses</a:t>
+                      </a:r>
+                    </a:p>
+                  </a:txBody>
+                  <a:tcPr>
+                    <a:solidFill>
+                      <a:srgbClr val="E7E6E6"/>
+                    </a:solidFill>
+                  </a:tcPr>
+                </a:tc>
+                <a:tc>
+                  <a:txBody>
+                    <a:bodyPr/>
+                    <a:lstStyle/>
+                    <a:p>
+                      <a:r>
+                        <a:rPr sz="1100"/>
+                        <a:t>$2,904</a:t>
+                      </a:r>
+                    </a:p>
+                  </a:txBody>
+                  <a:tcPr>
+                    <a:solidFill>
+                      <a:srgbClr val="E7E6E6"/>
+                    </a:solidFill>
+                  </a:tcPr>
+                </a:tc>
+                <a:tc>
+                  <a:txBody>
+                    <a:bodyPr/>
+                    <a:lstStyle/>
+                    <a:p>
+                      <a:r>
+                        <a:rPr sz="1100"/>
+                        <a:t>$0</a:t>
+                      </a:r>
+                    </a:p>
+                  </a:txBody>
+                  <a:tcPr>
+                    <a:solidFill>
+                      <a:srgbClr val="E7E6E6"/>
+                    </a:solidFill>
+                  </a:tcPr>
+                </a:tc>
+                <a:tc>
+                  <a:txBody>
+                    <a:bodyPr/>
+                    <a:lstStyle/>
+                    <a:p>
+                      <a:r>
+                        <a:rPr sz="1100"/>
+                        <a:t>$2,904</a:t>
+                      </a:r>
+                    </a:p>
+                  </a:txBody>
+                  <a:tcPr>
+                    <a:solidFill>
+                      <a:srgbClr val="E7E6E6"/>
+                    </a:solidFill>
+                  </a:tcPr>
+                </a:tc>
+                <a:tc>
+                  <a:txBody>
+                    <a:bodyPr/>
+                    <a:lstStyle/>
+                    <a:p>
+                      <a:r>
+                        <a:rPr sz="1100"/>
+                        <a:t>$2,904</a:t>
+                      </a:r>
+                    </a:p>
+                  </a:txBody>
+                  <a:tcPr>
+                    <a:solidFill>
+                      <a:srgbClr val="E7E6E6"/>
+                    </a:solidFill>
+                  </a:tcPr>
+                </a:tc>
+                <a:tc>
+                  <a:txBody>
+                    <a:bodyPr/>
+                    <a:lstStyle/>
+                    <a:p>
+                      <a:r>
+                        <a:rPr sz="1100"/>
+                        <a:t>$2,904</a:t>
+                      </a:r>
+                    </a:p>
+                  </a:txBody>
+                  <a:tcPr>
+                    <a:solidFill>
+                      <a:srgbClr val="E7E6E6"/>
+                    </a:solidFill>
+                  </a:tcPr>
+                </a:tc>
+                <a:tc>
+                  <a:txBody>
+                    <a:bodyPr/>
+                    <a:lstStyle/>
+                    <a:p>
+                      <a:r>
+                        <a:rPr sz="1100"/>
+                        <a:t>$8,712</a:t>
+                      </a:r>
+                    </a:p>
+                  </a:txBody>
+                  <a:tcPr>
+                    <a:solidFill>
+                      <a:srgbClr val="E7E6E6"/>
+                    </a:solidFill>
+                  </a:tcPr>
+                </a:tc>
+              </a:tr>
+              <a:tr h="370840">
+                <a:tc>
+                  <a:txBody>
+                    <a:bodyPr/>
+                    <a:lstStyle/>
+                    <a:p>
+                      <a:r>
+                        <a:rPr sz="1100"/>
+                        <a:t>Support &amp; Maintenance</a:t>
+                      </a:r>
+                    </a:p>
+                  </a:txBody>
+                  <a:tcPr>
+                    <a:solidFill>
+                      <a:srgbClr val="E7E6E6"/>
+                    </a:solidFill>
+                  </a:tcPr>
+                </a:tc>
+                <a:tc>
+                  <a:txBody>
+                    <a:bodyPr/>
+                    <a:lstStyle/>
+                    <a:p>
+                      <a:r>
+                        <a:rPr sz="1100"/>
+                        <a:t>$2,676</a:t>
+                      </a:r>
+                    </a:p>
+                  </a:txBody>
+                  <a:tcPr>
+                    <a:solidFill>
+                      <a:srgbClr val="E7E6E6"/>
+                    </a:solidFill>
+                  </a:tcPr>
+                </a:tc>
+                <a:tc>
+                  <a:txBody>
+                    <a:bodyPr/>
+                    <a:lstStyle/>
+                    <a:p>
+                      <a:r>
+                        <a:rPr sz="1100"/>
+                        <a:t>$0</a:t>
+                      </a:r>
+                    </a:p>
+                  </a:txBody>
+                  <a:tcPr>
+                    <a:solidFill>
+                      <a:srgbClr val="E7E6E6"/>
+                    </a:solidFill>
+                  </a:tcPr>
+                </a:tc>
+                <a:tc>
+                  <a:txBody>
+                    <a:bodyPr/>
+                    <a:lstStyle/>
+                    <a:p>
+                      <a:r>
+                        <a:rPr sz="1100"/>
+                        <a:t>$2,676</a:t>
+                      </a:r>
+                    </a:p>
+                  </a:txBody>
+                  <a:tcPr>
+                    <a:solidFill>
+                      <a:srgbClr val="E7E6E6"/>
+                    </a:solidFill>
+                  </a:tcPr>
+                </a:tc>
+                <a:tc>
+                  <a:txBody>
+                    <a:bodyPr/>
+                    <a:lstStyle/>
+                    <a:p>
+                      <a:r>
+                        <a:rPr sz="1100"/>
+                        <a:t>$2,676</a:t>
+                      </a:r>
+                    </a:p>
+                  </a:txBody>
+                  <a:tcPr>
+                    <a:solidFill>
+                      <a:srgbClr val="E7E6E6"/>
+                    </a:solidFill>
+                  </a:tcPr>
+                </a:tc>
+                <a:tc>
+                  <a:txBody>
+                    <a:bodyPr/>
+                    <a:lstStyle/>
+                    <a:p>
+                      <a:r>
+                        <a:rPr sz="1100"/>
+                        <a:t>$2,676</a:t>
+                      </a:r>
+                    </a:p>
+                  </a:txBody>
+                  <a:tcPr>
+                    <a:solidFill>
+                      <a:srgbClr val="E7E6E6"/>
+                    </a:solidFill>
+                  </a:tcPr>
+                </a:tc>
+                <a:tc>
+                  <a:txBody>
+                    <a:bodyPr/>
+                    <a:lstStyle/>
+                    <a:p>
+                      <a:r>
+                        <a:rPr sz="1100"/>
+                        <a:t>$8,028</a:t>
+                      </a:r>
+                    </a:p>
+                  </a:txBody>
+                  <a:tcPr>
+                    <a:solidFill>
+                      <a:srgbClr val="E7E6E6"/>
+                    </a:solidFill>
+                  </a:tcPr>
+                </a:tc>
+              </a:tr>
+              <a:tr h="370840">
+                <a:tc>
+                  <a:txBody>
+                    <a:bodyPr/>
+                    <a:lstStyle/>
+                    <a:p>
+                      <a:r>
                         <a:rPr b="1" sz="1100"/>
                         <a:t>TOTAL INVESTMENT</a:t>
                       </a:r>
@@ -6142,7 +6626,7 @@
                     <a:p>
                       <a:r>
                         <a:rPr b="1" sz="1100"/>
-                        <a:t>$0</a:t>
+                        <a:t>$106,358</a:t>
                       </a:r>
                     </a:p>
                   </a:txBody>
@@ -6159,7 +6643,7 @@
                     <a:p>
                       <a:r>
                         <a:rPr b="1" sz="1100"/>
-                        <a:t>$0</a:t>
+                        <a:t>($13,690)</a:t>
                       </a:r>
                     </a:p>
                   </a:txBody>
@@ -6176,7 +6660,7 @@
                     <a:p>
                       <a:r>
                         <a:rPr b="1" sz="1100"/>
-                        <a:t>$0</a:t>
+                        <a:t>$92,668</a:t>
                       </a:r>
                     </a:p>
                   </a:txBody>
@@ -6193,7 +6677,7 @@
                     <a:p>
                       <a:r>
                         <a:rPr b="1" sz="1100"/>
-                        <a:t>$0</a:t>
+                        <a:t>$24,108</a:t>
                       </a:r>
                     </a:p>
                   </a:txBody>
@@ -6210,7 +6694,7 @@
                     <a:p>
                       <a:r>
                         <a:rPr b="1" sz="1100"/>
-                        <a:t>$0</a:t>
+                        <a:t>$24,108</a:t>
                       </a:r>
                     </a:p>
                   </a:txBody>
@@ -6227,7 +6711,7 @@
                     <a:p>
                       <a:r>
                         <a:rPr b="1" sz="1100"/>
-                        <a:t>$0</a:t>
+                        <a:t>$140,884</a:t>
                       </a:r>
                     </a:p>
                   </a:txBody>

</xml_diff>

<commit_message>
Regenerate all Azure solution briefing PPTX files with updated template
All 6 Azure solution briefing presentations regenerated:
- ai/document-intelligence (607 KB)
- cloud/enterprise-landing-zone (652 KB)
- cyber-security/sentinel-siem (782 KB)
- devops/enterprise-platform (399 KB)
- modern-workspace/virtual-desktop (600 KB)
- network/virtual-wan-global (582 KB)

Generated with updated PowerPoint template (Nov 22 17:25-17:26).

🤖 Generated with Claude Code (https://claude.com/claude-code)

Co-Authored-By: Claude <noreply@anthropic.com>
</commit_message>
<xml_diff>
--- a/solutions/azure/ai/document-intelligence/presales/solution-briefing.pptx
+++ b/solutions/azure/ai/document-intelligence/presales/solution-briefing.pptx
@@ -693,6 +693,39 @@
       </p:grpSpPr>
       <p:sp>
         <p:nvSpPr>
+          <p:cNvPr id="12" name="Picture Placeholder 13">
+            <a:extLst>
+              <a:ext uri="{FF2B5EF4-FFF2-40B4-BE49-F238E27FC236}">
+                <a16:creationId xmlns:a16="http://schemas.microsoft.com/office/drawing/2014/main" id="{2DB97592-C4D5-B315-7F11-AA14F6EE8A62}"/>
+              </a:ext>
+            </a:extLst>
+          </p:cNvPr>
+          <p:cNvSpPr>
+            <a:spLocks noGrp="1"/>
+          </p:cNvSpPr>
+          <p:nvPr>
+            <p:ph type="pic" sz="quarter" idx="13"/>
+          </p:nvPr>
+        </p:nvSpPr>
+        <p:spPr>
+          <a:xfrm>
+            <a:off x="313593" y="4536078"/>
+            <a:ext cx="2143858" cy="529698"/>
+          </a:xfrm>
+          <a:prstGeom prst="rect">
+            <a:avLst/>
+          </a:prstGeom>
+        </p:spPr>
+        <p:txBody>
+          <a:bodyPr/>
+          <a:lstStyle/>
+          <a:p>
+            <a:endParaRPr lang="en-US" dirty="0"/>
+          </a:p>
+        </p:txBody>
+      </p:sp>
+      <p:sp>
+        <p:nvSpPr>
           <p:cNvPr id="3" name="Shape 1">
             <a:extLst>
               <a:ext uri="{FF2B5EF4-FFF2-40B4-BE49-F238E27FC236}">
@@ -782,39 +815,6 @@
               <a:rPr lang="en-US" dirty="0"/>
               <a:t>Slide Title</a:t>
             </a:r>
-          </a:p>
-        </p:txBody>
-      </p:sp>
-      <p:sp>
-        <p:nvSpPr>
-          <p:cNvPr id="12" name="Picture Placeholder 13">
-            <a:extLst>
-              <a:ext uri="{FF2B5EF4-FFF2-40B4-BE49-F238E27FC236}">
-                <a16:creationId xmlns:a16="http://schemas.microsoft.com/office/drawing/2014/main" id="{2DB97592-C4D5-B315-7F11-AA14F6EE8A62}"/>
-              </a:ext>
-            </a:extLst>
-          </p:cNvPr>
-          <p:cNvSpPr>
-            <a:spLocks noGrp="1"/>
-          </p:cNvSpPr>
-          <p:nvPr>
-            <p:ph type="pic" sz="quarter" idx="13"/>
-          </p:nvPr>
-        </p:nvSpPr>
-        <p:spPr>
-          <a:xfrm>
-            <a:off x="313593" y="4536078"/>
-            <a:ext cx="2143858" cy="529698"/>
-          </a:xfrm>
-          <a:prstGeom prst="rect">
-            <a:avLst/>
-          </a:prstGeom>
-        </p:spPr>
-        <p:txBody>
-          <a:bodyPr/>
-          <a:lstStyle/>
-          <a:p>
-            <a:endParaRPr lang="en-US" dirty="0"/>
           </a:p>
         </p:txBody>
       </p:sp>
@@ -971,6 +971,39 @@
       </p:grpSpPr>
       <p:sp>
         <p:nvSpPr>
+          <p:cNvPr id="12" name="Picture Placeholder 13">
+            <a:extLst>
+              <a:ext uri="{FF2B5EF4-FFF2-40B4-BE49-F238E27FC236}">
+                <a16:creationId xmlns:a16="http://schemas.microsoft.com/office/drawing/2014/main" id="{2DB97592-C4D5-B315-7F11-AA14F6EE8A62}"/>
+              </a:ext>
+            </a:extLst>
+          </p:cNvPr>
+          <p:cNvSpPr>
+            <a:spLocks noGrp="1"/>
+          </p:cNvSpPr>
+          <p:nvPr>
+            <p:ph type="pic" sz="quarter" idx="13"/>
+          </p:nvPr>
+        </p:nvSpPr>
+        <p:spPr>
+          <a:xfrm>
+            <a:off x="313593" y="4536078"/>
+            <a:ext cx="2143858" cy="529698"/>
+          </a:xfrm>
+          <a:prstGeom prst="rect">
+            <a:avLst/>
+          </a:prstGeom>
+        </p:spPr>
+        <p:txBody>
+          <a:bodyPr/>
+          <a:lstStyle/>
+          <a:p>
+            <a:endParaRPr lang="en-US" dirty="0"/>
+          </a:p>
+        </p:txBody>
+      </p:sp>
+      <p:sp>
+        <p:nvSpPr>
           <p:cNvPr id="3" name="Shape 1">
             <a:extLst>
               <a:ext uri="{FF2B5EF4-FFF2-40B4-BE49-F238E27FC236}">
@@ -1060,39 +1093,6 @@
               <a:rPr lang="en-US" dirty="0"/>
               <a:t>Bullet Points</a:t>
             </a:r>
-          </a:p>
-        </p:txBody>
-      </p:sp>
-      <p:sp>
-        <p:nvSpPr>
-          <p:cNvPr id="12" name="Picture Placeholder 13">
-            <a:extLst>
-              <a:ext uri="{FF2B5EF4-FFF2-40B4-BE49-F238E27FC236}">
-                <a16:creationId xmlns:a16="http://schemas.microsoft.com/office/drawing/2014/main" id="{2DB97592-C4D5-B315-7F11-AA14F6EE8A62}"/>
-              </a:ext>
-            </a:extLst>
-          </p:cNvPr>
-          <p:cNvSpPr>
-            <a:spLocks noGrp="1"/>
-          </p:cNvSpPr>
-          <p:nvPr>
-            <p:ph type="pic" sz="quarter" idx="13"/>
-          </p:nvPr>
-        </p:nvSpPr>
-        <p:spPr>
-          <a:xfrm>
-            <a:off x="313593" y="4536078"/>
-            <a:ext cx="2143858" cy="529698"/>
-          </a:xfrm>
-          <a:prstGeom prst="rect">
-            <a:avLst/>
-          </a:prstGeom>
-        </p:spPr>
-        <p:txBody>
-          <a:bodyPr/>
-          <a:lstStyle/>
-          <a:p>
-            <a:endParaRPr lang="en-US" dirty="0"/>
           </a:p>
         </p:txBody>
       </p:sp>
@@ -1235,6 +1235,39 @@
       </p:grpSpPr>
       <p:sp>
         <p:nvSpPr>
+          <p:cNvPr id="10" name="Picture Placeholder 13">
+            <a:extLst>
+              <a:ext uri="{FF2B5EF4-FFF2-40B4-BE49-F238E27FC236}">
+                <a16:creationId xmlns:a16="http://schemas.microsoft.com/office/drawing/2014/main" id="{6A0FA445-7602-F06E-EC73-5504EBF827CC}"/>
+              </a:ext>
+            </a:extLst>
+          </p:cNvPr>
+          <p:cNvSpPr>
+            <a:spLocks noGrp="1"/>
+          </p:cNvSpPr>
+          <p:nvPr>
+            <p:ph type="pic" sz="quarter" idx="14"/>
+          </p:nvPr>
+        </p:nvSpPr>
+        <p:spPr>
+          <a:xfrm>
+            <a:off x="313592" y="4536078"/>
+            <a:ext cx="2121877" cy="529698"/>
+          </a:xfrm>
+          <a:prstGeom prst="rect">
+            <a:avLst/>
+          </a:prstGeom>
+        </p:spPr>
+        <p:txBody>
+          <a:bodyPr/>
+          <a:lstStyle/>
+          <a:p>
+            <a:endParaRPr lang="en-US" dirty="0"/>
+          </a:p>
+        </p:txBody>
+      </p:sp>
+      <p:sp>
+        <p:nvSpPr>
           <p:cNvPr id="3" name="Shape 1">
             <a:extLst>
               <a:ext uri="{FF2B5EF4-FFF2-40B4-BE49-F238E27FC236}">
@@ -1324,39 +1357,6 @@
               <a:rPr lang="en-US" dirty="0"/>
               <a:t>Two Column Layout</a:t>
             </a:r>
-          </a:p>
-        </p:txBody>
-      </p:sp>
-      <p:sp>
-        <p:nvSpPr>
-          <p:cNvPr id="10" name="Picture Placeholder 13">
-            <a:extLst>
-              <a:ext uri="{FF2B5EF4-FFF2-40B4-BE49-F238E27FC236}">
-                <a16:creationId xmlns:a16="http://schemas.microsoft.com/office/drawing/2014/main" id="{6A0FA445-7602-F06E-EC73-5504EBF827CC}"/>
-              </a:ext>
-            </a:extLst>
-          </p:cNvPr>
-          <p:cNvSpPr>
-            <a:spLocks noGrp="1"/>
-          </p:cNvSpPr>
-          <p:nvPr>
-            <p:ph type="pic" sz="quarter" idx="14"/>
-          </p:nvPr>
-        </p:nvSpPr>
-        <p:spPr>
-          <a:xfrm>
-            <a:off x="313592" y="4536078"/>
-            <a:ext cx="2121877" cy="529698"/>
-          </a:xfrm>
-          <a:prstGeom prst="rect">
-            <a:avLst/>
-          </a:prstGeom>
-        </p:spPr>
-        <p:txBody>
-          <a:bodyPr/>
-          <a:lstStyle/>
-          <a:p>
-            <a:endParaRPr lang="en-US" dirty="0"/>
           </a:p>
         </p:txBody>
       </p:sp>
@@ -1604,6 +1604,39 @@
       </p:grpSpPr>
       <p:sp>
         <p:nvSpPr>
+          <p:cNvPr id="12" name="Picture Placeholder 13">
+            <a:extLst>
+              <a:ext uri="{FF2B5EF4-FFF2-40B4-BE49-F238E27FC236}">
+                <a16:creationId xmlns:a16="http://schemas.microsoft.com/office/drawing/2014/main" id="{2DB97592-C4D5-B315-7F11-AA14F6EE8A62}"/>
+              </a:ext>
+            </a:extLst>
+          </p:cNvPr>
+          <p:cNvSpPr>
+            <a:spLocks noGrp="1"/>
+          </p:cNvSpPr>
+          <p:nvPr>
+            <p:ph type="pic" sz="quarter" idx="13"/>
+          </p:nvPr>
+        </p:nvSpPr>
+        <p:spPr>
+          <a:xfrm>
+            <a:off x="313592" y="4536078"/>
+            <a:ext cx="2126273" cy="529698"/>
+          </a:xfrm>
+          <a:prstGeom prst="rect">
+            <a:avLst/>
+          </a:prstGeom>
+        </p:spPr>
+        <p:txBody>
+          <a:bodyPr/>
+          <a:lstStyle/>
+          <a:p>
+            <a:endParaRPr lang="en-US" dirty="0"/>
+          </a:p>
+        </p:txBody>
+      </p:sp>
+      <p:sp>
+        <p:nvSpPr>
           <p:cNvPr id="3" name="Shape 1">
             <a:extLst>
               <a:ext uri="{FF2B5EF4-FFF2-40B4-BE49-F238E27FC236}">
@@ -1719,39 +1752,6 @@
           </a:p>
           <a:p>
             <a:pPr lvl="0"/>
-            <a:endParaRPr lang="en-US" dirty="0"/>
-          </a:p>
-        </p:txBody>
-      </p:sp>
-      <p:sp>
-        <p:nvSpPr>
-          <p:cNvPr id="12" name="Picture Placeholder 13">
-            <a:extLst>
-              <a:ext uri="{FF2B5EF4-FFF2-40B4-BE49-F238E27FC236}">
-                <a16:creationId xmlns:a16="http://schemas.microsoft.com/office/drawing/2014/main" id="{2DB97592-C4D5-B315-7F11-AA14F6EE8A62}"/>
-              </a:ext>
-            </a:extLst>
-          </p:cNvPr>
-          <p:cNvSpPr>
-            <a:spLocks noGrp="1"/>
-          </p:cNvSpPr>
-          <p:nvPr>
-            <p:ph type="pic" sz="quarter" idx="13"/>
-          </p:nvPr>
-        </p:nvSpPr>
-        <p:spPr>
-          <a:xfrm>
-            <a:off x="313592" y="4536078"/>
-            <a:ext cx="2126273" cy="529698"/>
-          </a:xfrm>
-          <a:prstGeom prst="rect">
-            <a:avLst/>
-          </a:prstGeom>
-        </p:spPr>
-        <p:txBody>
-          <a:bodyPr/>
-          <a:lstStyle/>
-          <a:p>
             <a:endParaRPr lang="en-US" dirty="0"/>
           </a:p>
         </p:txBody>
@@ -1863,6 +1863,39 @@
       </p:grpSpPr>
       <p:sp>
         <p:nvSpPr>
+          <p:cNvPr id="10" name="Picture Placeholder 13">
+            <a:extLst>
+              <a:ext uri="{FF2B5EF4-FFF2-40B4-BE49-F238E27FC236}">
+                <a16:creationId xmlns:a16="http://schemas.microsoft.com/office/drawing/2014/main" id="{6A0FA445-7602-F06E-EC73-5504EBF827CC}"/>
+              </a:ext>
+            </a:extLst>
+          </p:cNvPr>
+          <p:cNvSpPr>
+            <a:spLocks noGrp="1"/>
+          </p:cNvSpPr>
+          <p:nvPr>
+            <p:ph type="pic" sz="quarter" idx="14"/>
+          </p:nvPr>
+        </p:nvSpPr>
+        <p:spPr>
+          <a:xfrm>
+            <a:off x="313592" y="4536078"/>
+            <a:ext cx="2130670" cy="529698"/>
+          </a:xfrm>
+          <a:prstGeom prst="rect">
+            <a:avLst/>
+          </a:prstGeom>
+        </p:spPr>
+        <p:txBody>
+          <a:bodyPr/>
+          <a:lstStyle/>
+          <a:p>
+            <a:endParaRPr lang="en-US" dirty="0"/>
+          </a:p>
+        </p:txBody>
+      </p:sp>
+      <p:sp>
+        <p:nvSpPr>
           <p:cNvPr id="3" name="Shape 1">
             <a:extLst>
               <a:ext uri="{FF2B5EF4-FFF2-40B4-BE49-F238E27FC236}">
@@ -1952,39 +1985,6 @@
               <a:rPr lang="en-US" dirty="0"/>
               <a:t>Visual Content</a:t>
             </a:r>
-          </a:p>
-        </p:txBody>
-      </p:sp>
-      <p:sp>
-        <p:nvSpPr>
-          <p:cNvPr id="10" name="Picture Placeholder 13">
-            <a:extLst>
-              <a:ext uri="{FF2B5EF4-FFF2-40B4-BE49-F238E27FC236}">
-                <a16:creationId xmlns:a16="http://schemas.microsoft.com/office/drawing/2014/main" id="{6A0FA445-7602-F06E-EC73-5504EBF827CC}"/>
-              </a:ext>
-            </a:extLst>
-          </p:cNvPr>
-          <p:cNvSpPr>
-            <a:spLocks noGrp="1"/>
-          </p:cNvSpPr>
-          <p:nvPr>
-            <p:ph type="pic" sz="quarter" idx="14"/>
-          </p:nvPr>
-        </p:nvSpPr>
-        <p:spPr>
-          <a:xfrm>
-            <a:off x="313592" y="4536078"/>
-            <a:ext cx="2130670" cy="529698"/>
-          </a:xfrm>
-          <a:prstGeom prst="rect">
-            <a:avLst/>
-          </a:prstGeom>
-        </p:spPr>
-        <p:txBody>
-          <a:bodyPr/>
-          <a:lstStyle/>
-          <a:p>
-            <a:endParaRPr lang="en-US" dirty="0"/>
           </a:p>
         </p:txBody>
       </p:sp>
@@ -2180,6 +2180,39 @@
       </p:grpSpPr>
       <p:sp>
         <p:nvSpPr>
+          <p:cNvPr id="10" name="Picture Placeholder 13">
+            <a:extLst>
+              <a:ext uri="{FF2B5EF4-FFF2-40B4-BE49-F238E27FC236}">
+                <a16:creationId xmlns:a16="http://schemas.microsoft.com/office/drawing/2014/main" id="{6A0FA445-7602-F06E-EC73-5504EBF827CC}"/>
+              </a:ext>
+            </a:extLst>
+          </p:cNvPr>
+          <p:cNvSpPr>
+            <a:spLocks noGrp="1"/>
+          </p:cNvSpPr>
+          <p:nvPr>
+            <p:ph type="pic" sz="quarter" idx="14"/>
+          </p:nvPr>
+        </p:nvSpPr>
+        <p:spPr>
+          <a:xfrm>
+            <a:off x="313592" y="4536078"/>
+            <a:ext cx="2104294" cy="529698"/>
+          </a:xfrm>
+          <a:prstGeom prst="rect">
+            <a:avLst/>
+          </a:prstGeom>
+        </p:spPr>
+        <p:txBody>
+          <a:bodyPr/>
+          <a:lstStyle/>
+          <a:p>
+            <a:endParaRPr lang="en-US" dirty="0"/>
+          </a:p>
+        </p:txBody>
+      </p:sp>
+      <p:sp>
+        <p:nvSpPr>
           <p:cNvPr id="3" name="Shape 1">
             <a:extLst>
               <a:ext uri="{FF2B5EF4-FFF2-40B4-BE49-F238E27FC236}">
@@ -2269,39 +2302,6 @@
               <a:rPr lang="en-US" dirty="0"/>
               <a:t>Data Visualization</a:t>
             </a:r>
-          </a:p>
-        </p:txBody>
-      </p:sp>
-      <p:sp>
-        <p:nvSpPr>
-          <p:cNvPr id="10" name="Picture Placeholder 13">
-            <a:extLst>
-              <a:ext uri="{FF2B5EF4-FFF2-40B4-BE49-F238E27FC236}">
-                <a16:creationId xmlns:a16="http://schemas.microsoft.com/office/drawing/2014/main" id="{6A0FA445-7602-F06E-EC73-5504EBF827CC}"/>
-              </a:ext>
-            </a:extLst>
-          </p:cNvPr>
-          <p:cNvSpPr>
-            <a:spLocks noGrp="1"/>
-          </p:cNvSpPr>
-          <p:nvPr>
-            <p:ph type="pic" sz="quarter" idx="14"/>
-          </p:nvPr>
-        </p:nvSpPr>
-        <p:spPr>
-          <a:xfrm>
-            <a:off x="313592" y="4536078"/>
-            <a:ext cx="2104294" cy="529698"/>
-          </a:xfrm>
-          <a:prstGeom prst="rect">
-            <a:avLst/>
-          </a:prstGeom>
-        </p:spPr>
-        <p:txBody>
-          <a:bodyPr/>
-          <a:lstStyle/>
-          <a:p>
-            <a:endParaRPr lang="en-US" dirty="0"/>
           </a:p>
         </p:txBody>
       </p:sp>
@@ -3423,7 +3423,7 @@
       <p:grpSpPr/>
       <p:sp>
         <p:nvSpPr>
-          <p:cNvPr id="2" name="Text Placeholder 1"/>
+          <p:cNvPr id="3" name="Text Placeholder 2"/>
           <p:cNvSpPr>
             <a:spLocks noGrp="1"/>
           </p:cNvSpPr>
@@ -3727,7 +3727,7 @@
       <p:grpSpPr/>
       <p:sp>
         <p:nvSpPr>
-          <p:cNvPr id="2" name="Text Placeholder 1"/>
+          <p:cNvPr id="3" name="Text Placeholder 2"/>
           <p:cNvSpPr>
             <a:spLocks noGrp="1"/>
           </p:cNvSpPr>
@@ -3902,7 +3902,7 @@
       <p:grpSpPr/>
       <p:sp>
         <p:nvSpPr>
-          <p:cNvPr id="2" name="Text Placeholder 1"/>
+          <p:cNvPr id="3" name="Text Placeholder 2"/>
           <p:cNvSpPr>
             <a:spLocks noGrp="1"/>
           </p:cNvSpPr>
@@ -4780,7 +4780,7 @@
       <p:grpSpPr/>
       <p:sp>
         <p:nvSpPr>
-          <p:cNvPr id="2" name="Text Placeholder 1"/>
+          <p:cNvPr id="3" name="Text Placeholder 2"/>
           <p:cNvSpPr>
             <a:spLocks noGrp="1"/>
           </p:cNvSpPr>
@@ -4969,7 +4969,7 @@
       <p:grpSpPr/>
       <p:sp>
         <p:nvSpPr>
-          <p:cNvPr id="2" name="Text Placeholder 1"/>
+          <p:cNvPr id="3" name="Text Placeholder 2"/>
           <p:cNvSpPr>
             <a:spLocks noGrp="1"/>
           </p:cNvSpPr>
@@ -5153,7 +5153,7 @@
       <p:grpSpPr/>
       <p:sp>
         <p:nvSpPr>
-          <p:cNvPr id="2" name="Text Placeholder 1"/>
+          <p:cNvPr id="3" name="Text Placeholder 2"/>
           <p:cNvSpPr>
             <a:spLocks noGrp="1"/>
           </p:cNvSpPr>
@@ -5572,7 +5572,7 @@
       <p:grpSpPr/>
       <p:sp>
         <p:nvSpPr>
-          <p:cNvPr id="2" name="Text Placeholder 1"/>
+          <p:cNvPr id="3" name="Text Placeholder 2"/>
           <p:cNvSpPr>
             <a:spLocks noGrp="1"/>
           </p:cNvSpPr>
@@ -5745,7 +5745,7 @@
       <p:grpSpPr/>
       <p:sp>
         <p:nvSpPr>
-          <p:cNvPr id="2" name="Text Placeholder 1"/>
+          <p:cNvPr id="3" name="Text Placeholder 2"/>
           <p:cNvSpPr>
             <a:spLocks noGrp="1"/>
           </p:cNvSpPr>
@@ -5932,7 +5932,7 @@
       <p:grpSpPr/>
       <p:sp>
         <p:nvSpPr>
-          <p:cNvPr id="2" name="Text Placeholder 1"/>
+          <p:cNvPr id="3" name="Text Placeholder 2"/>
           <p:cNvSpPr>
             <a:spLocks noGrp="1"/>
           </p:cNvSpPr>

</xml_diff>